<commit_message>
Added fuel and heat gauge
</commit_message>
<xml_diff>
--- a/notes.pptx
+++ b/notes.pptx
@@ -106,6 +106,11 @@
       </a:defRPr>
     </a:lvl9pPr>
   </p:defaultTextStyle>
+  <p:extLst>
+    <p:ext uri="{EFAFB233-063F-42B5-8137-9DF3F51BA10A}">
+      <p15:sldGuideLst xmlns:p15="http://schemas.microsoft.com/office/powerpoint/2012/main"/>
+    </p:ext>
+  </p:extLst>
 </p:presentation>
 </file>
 
@@ -258,7 +263,7 @@
           <a:p>
             <a:fld id="{2520F6F4-E946-1746-9921-C7E20A3E8025}" type="datetimeFigureOut">
               <a:rPr lang="en-US" smtClean="0"/>
-              <a:t>3/18/20</a:t>
+              <a:t>3/19/20</a:t>
             </a:fld>
             <a:endParaRPr lang="en-US"/>
           </a:p>
@@ -458,7 +463,7 @@
           <a:p>
             <a:fld id="{2520F6F4-E946-1746-9921-C7E20A3E8025}" type="datetimeFigureOut">
               <a:rPr lang="en-US" smtClean="0"/>
-              <a:t>3/18/20</a:t>
+              <a:t>3/19/20</a:t>
             </a:fld>
             <a:endParaRPr lang="en-US"/>
           </a:p>
@@ -668,7 +673,7 @@
           <a:p>
             <a:fld id="{2520F6F4-E946-1746-9921-C7E20A3E8025}" type="datetimeFigureOut">
               <a:rPr lang="en-US" smtClean="0"/>
-              <a:t>3/18/20</a:t>
+              <a:t>3/19/20</a:t>
             </a:fld>
             <a:endParaRPr lang="en-US"/>
           </a:p>
@@ -868,7 +873,7 @@
           <a:p>
             <a:fld id="{2520F6F4-E946-1746-9921-C7E20A3E8025}" type="datetimeFigureOut">
               <a:rPr lang="en-US" smtClean="0"/>
-              <a:t>3/18/20</a:t>
+              <a:t>3/19/20</a:t>
             </a:fld>
             <a:endParaRPr lang="en-US"/>
           </a:p>
@@ -1144,7 +1149,7 @@
           <a:p>
             <a:fld id="{2520F6F4-E946-1746-9921-C7E20A3E8025}" type="datetimeFigureOut">
               <a:rPr lang="en-US" smtClean="0"/>
-              <a:t>3/18/20</a:t>
+              <a:t>3/19/20</a:t>
             </a:fld>
             <a:endParaRPr lang="en-US"/>
           </a:p>
@@ -1412,7 +1417,7 @@
           <a:p>
             <a:fld id="{2520F6F4-E946-1746-9921-C7E20A3E8025}" type="datetimeFigureOut">
               <a:rPr lang="en-US" smtClean="0"/>
-              <a:t>3/18/20</a:t>
+              <a:t>3/19/20</a:t>
             </a:fld>
             <a:endParaRPr lang="en-US"/>
           </a:p>
@@ -1827,7 +1832,7 @@
           <a:p>
             <a:fld id="{2520F6F4-E946-1746-9921-C7E20A3E8025}" type="datetimeFigureOut">
               <a:rPr lang="en-US" smtClean="0"/>
-              <a:t>3/18/20</a:t>
+              <a:t>3/19/20</a:t>
             </a:fld>
             <a:endParaRPr lang="en-US"/>
           </a:p>
@@ -1969,7 +1974,7 @@
           <a:p>
             <a:fld id="{2520F6F4-E946-1746-9921-C7E20A3E8025}" type="datetimeFigureOut">
               <a:rPr lang="en-US" smtClean="0"/>
-              <a:t>3/18/20</a:t>
+              <a:t>3/19/20</a:t>
             </a:fld>
             <a:endParaRPr lang="en-US"/>
           </a:p>
@@ -2082,7 +2087,7 @@
           <a:p>
             <a:fld id="{2520F6F4-E946-1746-9921-C7E20A3E8025}" type="datetimeFigureOut">
               <a:rPr lang="en-US" smtClean="0"/>
-              <a:t>3/18/20</a:t>
+              <a:t>3/19/20</a:t>
             </a:fld>
             <a:endParaRPr lang="en-US"/>
           </a:p>
@@ -2395,7 +2400,7 @@
           <a:p>
             <a:fld id="{2520F6F4-E946-1746-9921-C7E20A3E8025}" type="datetimeFigureOut">
               <a:rPr lang="en-US" smtClean="0"/>
-              <a:t>3/18/20</a:t>
+              <a:t>3/19/20</a:t>
             </a:fld>
             <a:endParaRPr lang="en-US"/>
           </a:p>
@@ -2684,7 +2689,7 @@
           <a:p>
             <a:fld id="{2520F6F4-E946-1746-9921-C7E20A3E8025}" type="datetimeFigureOut">
               <a:rPr lang="en-US" smtClean="0"/>
-              <a:t>3/18/20</a:t>
+              <a:t>3/19/20</a:t>
             </a:fld>
             <a:endParaRPr lang="en-US"/>
           </a:p>
@@ -2927,7 +2932,7 @@
           <a:p>
             <a:fld id="{2520F6F4-E946-1746-9921-C7E20A3E8025}" type="datetimeFigureOut">
               <a:rPr lang="en-US" smtClean="0"/>
-              <a:t>3/18/20</a:t>
+              <a:t>3/19/20</a:t>
             </a:fld>
             <a:endParaRPr lang="en-US"/>
           </a:p>
@@ -3976,7 +3981,7 @@
         <p:spPr/>
         <p:txBody>
           <a:bodyPr>
-            <a:normAutofit fontScale="62500" lnSpcReduction="20000"/>
+            <a:normAutofit fontScale="55000" lnSpcReduction="20000"/>
           </a:bodyPr>
           <a:lstStyle/>
           <a:p>
@@ -4003,7 +4008,7 @@
           </a:p>
           <a:p>
             <a:r>
-              <a:rPr lang="en-US" dirty="0"/>
+              <a:rPr lang="en-US" strike="sngStrike" dirty="0"/>
               <a:t>Show fuel</a:t>
             </a:r>
           </a:p>
@@ -4064,10 +4069,17 @@
               <a:rPr lang="en-US" dirty="0" err="1"/>
               <a:t>colour</a:t>
             </a:r>
+            <a:r>
+              <a:rPr lang="en-US"/>
+              <a:t> - STARTED</a:t>
+            </a:r>
             <a:endParaRPr lang="en-US" dirty="0"/>
           </a:p>
           <a:p>
-            <a:endParaRPr lang="en-US" dirty="0"/>
+            <a:r>
+              <a:rPr lang="en-US" dirty="0"/>
+              <a:t>When rocket dropping back, fuel stops, but if it hits the bottom of the screen, it explodes…..</a:t>
+            </a:r>
           </a:p>
         </p:txBody>
       </p:sp>

</xml_diff>

<commit_message>
Added launchpad and corrected heat issue
</commit_message>
<xml_diff>
--- a/notes.pptx
+++ b/notes.pptx
@@ -7,7 +7,9 @@
   <p:sldIdLst>
     <p:sldId id="256" r:id="rId2"/>
     <p:sldId id="258" r:id="rId3"/>
-    <p:sldId id="257" r:id="rId4"/>
+    <p:sldId id="260" r:id="rId4"/>
+    <p:sldId id="259" r:id="rId5"/>
+    <p:sldId id="257" r:id="rId6"/>
   </p:sldIdLst>
   <p:sldSz cx="12192000" cy="6858000"/>
   <p:notesSz cx="6858000" cy="9144000"/>
@@ -263,7 +265,7 @@
           <a:p>
             <a:fld id="{2520F6F4-E946-1746-9921-C7E20A3E8025}" type="datetimeFigureOut">
               <a:rPr lang="en-US" smtClean="0"/>
-              <a:t>3/19/20</a:t>
+              <a:t>3/20/20</a:t>
             </a:fld>
             <a:endParaRPr lang="en-US"/>
           </a:p>
@@ -463,7 +465,7 @@
           <a:p>
             <a:fld id="{2520F6F4-E946-1746-9921-C7E20A3E8025}" type="datetimeFigureOut">
               <a:rPr lang="en-US" smtClean="0"/>
-              <a:t>3/19/20</a:t>
+              <a:t>3/20/20</a:t>
             </a:fld>
             <a:endParaRPr lang="en-US"/>
           </a:p>
@@ -673,7 +675,7 @@
           <a:p>
             <a:fld id="{2520F6F4-E946-1746-9921-C7E20A3E8025}" type="datetimeFigureOut">
               <a:rPr lang="en-US" smtClean="0"/>
-              <a:t>3/19/20</a:t>
+              <a:t>3/20/20</a:t>
             </a:fld>
             <a:endParaRPr lang="en-US"/>
           </a:p>
@@ -873,7 +875,7 @@
           <a:p>
             <a:fld id="{2520F6F4-E946-1746-9921-C7E20A3E8025}" type="datetimeFigureOut">
               <a:rPr lang="en-US" smtClean="0"/>
-              <a:t>3/19/20</a:t>
+              <a:t>3/20/20</a:t>
             </a:fld>
             <a:endParaRPr lang="en-US"/>
           </a:p>
@@ -1149,7 +1151,7 @@
           <a:p>
             <a:fld id="{2520F6F4-E946-1746-9921-C7E20A3E8025}" type="datetimeFigureOut">
               <a:rPr lang="en-US" smtClean="0"/>
-              <a:t>3/19/20</a:t>
+              <a:t>3/20/20</a:t>
             </a:fld>
             <a:endParaRPr lang="en-US"/>
           </a:p>
@@ -1417,7 +1419,7 @@
           <a:p>
             <a:fld id="{2520F6F4-E946-1746-9921-C7E20A3E8025}" type="datetimeFigureOut">
               <a:rPr lang="en-US" smtClean="0"/>
-              <a:t>3/19/20</a:t>
+              <a:t>3/20/20</a:t>
             </a:fld>
             <a:endParaRPr lang="en-US"/>
           </a:p>
@@ -1832,7 +1834,7 @@
           <a:p>
             <a:fld id="{2520F6F4-E946-1746-9921-C7E20A3E8025}" type="datetimeFigureOut">
               <a:rPr lang="en-US" smtClean="0"/>
-              <a:t>3/19/20</a:t>
+              <a:t>3/20/20</a:t>
             </a:fld>
             <a:endParaRPr lang="en-US"/>
           </a:p>
@@ -1974,7 +1976,7 @@
           <a:p>
             <a:fld id="{2520F6F4-E946-1746-9921-C7E20A3E8025}" type="datetimeFigureOut">
               <a:rPr lang="en-US" smtClean="0"/>
-              <a:t>3/19/20</a:t>
+              <a:t>3/20/20</a:t>
             </a:fld>
             <a:endParaRPr lang="en-US"/>
           </a:p>
@@ -2087,7 +2089,7 @@
           <a:p>
             <a:fld id="{2520F6F4-E946-1746-9921-C7E20A3E8025}" type="datetimeFigureOut">
               <a:rPr lang="en-US" smtClean="0"/>
-              <a:t>3/19/20</a:t>
+              <a:t>3/20/20</a:t>
             </a:fld>
             <a:endParaRPr lang="en-US"/>
           </a:p>
@@ -2400,7 +2402,7 @@
           <a:p>
             <a:fld id="{2520F6F4-E946-1746-9921-C7E20A3E8025}" type="datetimeFigureOut">
               <a:rPr lang="en-US" smtClean="0"/>
-              <a:t>3/19/20</a:t>
+              <a:t>3/20/20</a:t>
             </a:fld>
             <a:endParaRPr lang="en-US"/>
           </a:p>
@@ -2689,7 +2691,7 @@
           <a:p>
             <a:fld id="{2520F6F4-E946-1746-9921-C7E20A3E8025}" type="datetimeFigureOut">
               <a:rPr lang="en-US" smtClean="0"/>
-              <a:t>3/19/20</a:t>
+              <a:t>3/20/20</a:t>
             </a:fld>
             <a:endParaRPr lang="en-US"/>
           </a:p>
@@ -2932,7 +2934,7 @@
           <a:p>
             <a:fld id="{2520F6F4-E946-1746-9921-C7E20A3E8025}" type="datetimeFigureOut">
               <a:rPr lang="en-US" smtClean="0"/>
-              <a:t>3/19/20</a:t>
+              <a:t>3/20/20</a:t>
             </a:fld>
             <a:endParaRPr lang="en-US"/>
           </a:p>
@@ -3475,87 +3477,6 @@
           </a:bodyPr>
           <a:lstStyle/>
           <a:p>
-            <a:pPr algn="ctr">
-              <a:lnSpc>
-                <a:spcPct val="90000"/>
-              </a:lnSpc>
-              <a:spcBef>
-                <a:spcPct val="0"/>
-              </a:spcBef>
-              <a:spcAft>
-                <a:spcPts val="600"/>
-              </a:spcAft>
-            </a:pPr>
-            <a:r>
-              <a:rPr lang="en-US" sz="5100" b="1" kern="1200" dirty="0">
-                <a:latin typeface="+mj-lt"/>
-                <a:ea typeface="+mj-ea"/>
-                <a:cs typeface="+mj-cs"/>
-              </a:rPr>
-              <a:t>SKY</a:t>
-            </a:r>
-          </a:p>
-          <a:p>
-            <a:pPr algn="ctr">
-              <a:lnSpc>
-                <a:spcPct val="90000"/>
-              </a:lnSpc>
-              <a:spcBef>
-                <a:spcPct val="0"/>
-              </a:spcBef>
-              <a:spcAft>
-                <a:spcPts val="600"/>
-              </a:spcAft>
-            </a:pPr>
-            <a:r>
-              <a:rPr lang="en-US" sz="5100" b="1" kern="1200" dirty="0">
-                <a:latin typeface="+mj-lt"/>
-                <a:ea typeface="+mj-ea"/>
-                <a:cs typeface="+mj-cs"/>
-              </a:rPr>
-              <a:t>ROKIT</a:t>
-            </a:r>
-          </a:p>
-          <a:p>
-            <a:pPr>
-              <a:lnSpc>
-                <a:spcPct val="90000"/>
-              </a:lnSpc>
-              <a:spcBef>
-                <a:spcPct val="0"/>
-              </a:spcBef>
-              <a:spcAft>
-                <a:spcPts val="600"/>
-              </a:spcAft>
-            </a:pPr>
-            <a:endParaRPr lang="en-US" sz="5100" b="1" kern="1200" dirty="0">
-              <a:latin typeface="+mj-lt"/>
-              <a:ea typeface="+mj-ea"/>
-              <a:cs typeface="+mj-cs"/>
-            </a:endParaRPr>
-          </a:p>
-          <a:p>
-            <a:pPr>
-              <a:lnSpc>
-                <a:spcPct val="90000"/>
-              </a:lnSpc>
-              <a:spcBef>
-                <a:spcPct val="0"/>
-              </a:spcBef>
-              <a:spcAft>
-                <a:spcPts val="600"/>
-              </a:spcAft>
-            </a:pPr>
-            <a:r>
-              <a:rPr lang="en-US" sz="5100" b="1" kern="1200" dirty="0">
-                <a:latin typeface="+mj-lt"/>
-                <a:ea typeface="+mj-ea"/>
-                <a:cs typeface="+mj-cs"/>
-              </a:rPr>
-              <a:t>for tic-80</a:t>
-            </a:r>
-          </a:p>
-          <a:p>
             <a:pPr>
               <a:lnSpc>
                 <a:spcPct val="90000"/>
@@ -3904,6 +3825,66 @@
           </a:custGeom>
         </p:spPr>
       </p:pic>
+      <p:pic>
+        <p:nvPicPr>
+          <p:cNvPr id="2" name="Picture 1">
+            <a:extLst>
+              <a:ext uri="{FF2B5EF4-FFF2-40B4-BE49-F238E27FC236}">
+                <a16:creationId xmlns:a16="http://schemas.microsoft.com/office/drawing/2014/main" id="{4EF3DBD6-0A6A-DE40-A49E-1E3FCCD25A22}"/>
+              </a:ext>
+            </a:extLst>
+          </p:cNvPr>
+          <p:cNvPicPr>
+            <a:picLocks noChangeAspect="1"/>
+          </p:cNvPicPr>
+          <p:nvPr/>
+        </p:nvPicPr>
+        <p:blipFill>
+          <a:blip r:embed="rId3"/>
+          <a:stretch>
+            <a:fillRect/>
+          </a:stretch>
+        </p:blipFill>
+        <p:spPr>
+          <a:xfrm>
+            <a:off x="3448706" y="-1"/>
+            <a:ext cx="8742989" cy="1482811"/>
+          </a:xfrm>
+          <a:prstGeom prst="rect">
+            <a:avLst/>
+          </a:prstGeom>
+        </p:spPr>
+      </p:pic>
+      <p:pic>
+        <p:nvPicPr>
+          <p:cNvPr id="3" name="Picture 2">
+            <a:extLst>
+              <a:ext uri="{FF2B5EF4-FFF2-40B4-BE49-F238E27FC236}">
+                <a16:creationId xmlns:a16="http://schemas.microsoft.com/office/drawing/2014/main" id="{AE9F0D44-7509-FE4E-AFB8-D55BF0DF3DE5}"/>
+              </a:ext>
+            </a:extLst>
+          </p:cNvPr>
+          <p:cNvPicPr>
+            <a:picLocks noChangeAspect="1"/>
+          </p:cNvPicPr>
+          <p:nvPr/>
+        </p:nvPicPr>
+        <p:blipFill>
+          <a:blip r:embed="rId4"/>
+          <a:stretch>
+            <a:fillRect/>
+          </a:stretch>
+        </p:blipFill>
+        <p:spPr>
+          <a:xfrm>
+            <a:off x="7468254" y="6069250"/>
+            <a:ext cx="4660900" cy="723900"/>
+          </a:xfrm>
+          <a:prstGeom prst="rect">
+            <a:avLst/>
+          </a:prstGeom>
+        </p:spPr>
+      </p:pic>
     </p:spTree>
     <p:extLst>
       <p:ext uri="{BB962C8B-B14F-4D97-AF65-F5344CB8AC3E}">
@@ -3986,6 +3967,18 @@
           <a:lstStyle/>
           <a:p>
             <a:r>
+              <a:rPr lang="en-US" dirty="0"/>
+              <a:t>Make starfield start blank, then steadily increase the amount of stars</a:t>
+            </a:r>
+          </a:p>
+          <a:p>
+            <a:r>
+              <a:rPr lang="en-US" dirty="0"/>
+              <a:t>Show launchpad</a:t>
+            </a:r>
+          </a:p>
+          <a:p>
+            <a:r>
               <a:rPr lang="en-US" strike="sngStrike" dirty="0"/>
               <a:t>Allow rocket to drop back when no button is pressed </a:t>
             </a:r>
@@ -3996,26 +3989,20 @@
           </a:p>
           <a:p>
             <a:r>
-              <a:rPr lang="en-US" dirty="0"/>
-              <a:t>Make starfield start blank, then steadily increase the amount of stars</a:t>
-            </a:r>
-          </a:p>
-          <a:p>
-            <a:r>
-              <a:rPr lang="en-US" dirty="0"/>
-              <a:t>Show launchpad</a:t>
-            </a:r>
-          </a:p>
-          <a:p>
-            <a:r>
               <a:rPr lang="en-US" strike="sngStrike" dirty="0"/>
               <a:t>Show fuel</a:t>
             </a:r>
           </a:p>
           <a:p>
             <a:r>
+              <a:rPr lang="en-US" strike="sngStrike" dirty="0"/>
+              <a:t>Show heat</a:t>
+            </a:r>
+          </a:p>
+          <a:p>
+            <a:r>
               <a:rPr lang="en-US" dirty="0"/>
-              <a:t>Show heat</a:t>
+              <a:t>Show score (height)</a:t>
             </a:r>
           </a:p>
           <a:p>
@@ -4070,15 +4057,14 @@
               <a:t>colour</a:t>
             </a:r>
             <a:r>
-              <a:rPr lang="en-US"/>
+              <a:rPr lang="en-US" dirty="0"/>
               <a:t> - STARTED</a:t>
             </a:r>
-            <a:endParaRPr lang="en-US" dirty="0"/>
           </a:p>
           <a:p>
             <a:r>
               <a:rPr lang="en-US" dirty="0"/>
-              <a:t>When rocket dropping back, fuel stops, but if it hits the bottom of the screen, it explodes…..</a:t>
+              <a:t>When rocket dropping back, fuel stops, but when it hits the bottom of the screen, it should explode…..</a:t>
             </a:r>
           </a:p>
         </p:txBody>
@@ -4097,6 +4083,405 @@
 </file>
 
 <file path=ppt/slides/slide3.xml><?xml version="1.0" encoding="utf-8"?>
+<p:sld xmlns:a="http://schemas.openxmlformats.org/drawingml/2006/main" xmlns:r="http://schemas.openxmlformats.org/officeDocument/2006/relationships" xmlns:p="http://schemas.openxmlformats.org/presentationml/2006/main">
+  <p:cSld>
+    <p:spTree>
+      <p:nvGrpSpPr>
+        <p:cNvPr id="1" name=""/>
+        <p:cNvGrpSpPr/>
+        <p:nvPr/>
+      </p:nvGrpSpPr>
+      <p:grpSpPr>
+        <a:xfrm>
+          <a:off x="0" y="0"/>
+          <a:ext cx="0" cy="0"/>
+          <a:chOff x="0" y="0"/>
+          <a:chExt cx="0" cy="0"/>
+        </a:xfrm>
+      </p:grpSpPr>
+      <p:sp>
+        <p:nvSpPr>
+          <p:cNvPr id="2" name="Title 1">
+            <a:extLst>
+              <a:ext uri="{FF2B5EF4-FFF2-40B4-BE49-F238E27FC236}">
+                <a16:creationId xmlns:a16="http://schemas.microsoft.com/office/drawing/2014/main" id="{EA4D8C31-3C17-2944-B111-ED6F2DF832C1}"/>
+              </a:ext>
+            </a:extLst>
+          </p:cNvPr>
+          <p:cNvSpPr>
+            <a:spLocks noGrp="1"/>
+          </p:cNvSpPr>
+          <p:nvPr>
+            <p:ph type="title"/>
+          </p:nvPr>
+        </p:nvSpPr>
+        <p:spPr/>
+        <p:txBody>
+          <a:bodyPr/>
+          <a:lstStyle/>
+          <a:p>
+            <a:r>
+              <a:rPr lang="en-US" dirty="0"/>
+              <a:t>Bugs</a:t>
+            </a:r>
+          </a:p>
+        </p:txBody>
+      </p:sp>
+      <p:sp>
+        <p:nvSpPr>
+          <p:cNvPr id="3" name="Content Placeholder 2">
+            <a:extLst>
+              <a:ext uri="{FF2B5EF4-FFF2-40B4-BE49-F238E27FC236}">
+                <a16:creationId xmlns:a16="http://schemas.microsoft.com/office/drawing/2014/main" id="{8C47E09D-E5D1-1543-961B-36B8CE3D2691}"/>
+              </a:ext>
+            </a:extLst>
+          </p:cNvPr>
+          <p:cNvSpPr>
+            <a:spLocks noGrp="1"/>
+          </p:cNvSpPr>
+          <p:nvPr>
+            <p:ph idx="1"/>
+          </p:nvPr>
+        </p:nvSpPr>
+        <p:spPr>
+          <a:xfrm>
+            <a:off x="1036981" y="1825625"/>
+            <a:ext cx="10515600" cy="4351338"/>
+          </a:xfrm>
+        </p:spPr>
+        <p:txBody>
+          <a:bodyPr>
+            <a:normAutofit fontScale="62500" lnSpcReduction="20000"/>
+          </a:bodyPr>
+          <a:lstStyle/>
+          <a:p>
+            <a:r>
+              <a:rPr lang="en-US" dirty="0"/>
+              <a:t>When power is not applied. heat should drop back – think this works.</a:t>
+            </a:r>
+          </a:p>
+          <a:p>
+            <a:endParaRPr lang="en-US" dirty="0"/>
+          </a:p>
+          <a:p>
+            <a:r>
+              <a:rPr lang="en-US" b="1" dirty="0"/>
+              <a:t>Heat</a:t>
+            </a:r>
+          </a:p>
+          <a:p>
+            <a:r>
+              <a:rPr lang="en-US" b="1" dirty="0"/>
+              <a:t> </a:t>
+            </a:r>
+            <a:r>
+              <a:rPr lang="en-US" b="1" strike="sngStrike" dirty="0" err="1"/>
+              <a:t>heatframe</a:t>
+            </a:r>
+            <a:r>
+              <a:rPr lang="en-US" b="1" strike="sngStrike" dirty="0"/>
+              <a:t> = 0</a:t>
+            </a:r>
+          </a:p>
+          <a:p>
+            <a:r>
+              <a:rPr lang="en-US" strike="sngStrike" dirty="0"/>
+              <a:t> heat – each frame increase </a:t>
+            </a:r>
+            <a:r>
+              <a:rPr lang="en-US" strike="sngStrike" dirty="0" err="1"/>
+              <a:t>heatframe</a:t>
+            </a:r>
+            <a:r>
+              <a:rPr lang="en-US" strike="sngStrike" dirty="0"/>
+              <a:t> by1 </a:t>
+            </a:r>
+            <a:r>
+              <a:rPr lang="en-US" dirty="0"/>
+              <a:t>– </a:t>
+            </a:r>
+            <a:r>
+              <a:rPr lang="en-US" strike="sngStrike" dirty="0"/>
+              <a:t>check if button is pressed</a:t>
+            </a:r>
+          </a:p>
+          <a:p>
+            <a:r>
+              <a:rPr lang="en-US" strike="sngStrike" dirty="0"/>
+              <a:t>    if button is pressed, add 1 to </a:t>
+            </a:r>
+            <a:r>
+              <a:rPr lang="en-US" strike="sngStrike" dirty="0" err="1"/>
+              <a:t>heatcounter</a:t>
+            </a:r>
+            <a:endParaRPr lang="en-US" strike="sngStrike" dirty="0"/>
+          </a:p>
+          <a:p>
+            <a:r>
+              <a:rPr lang="en-US" strike="sngStrike" dirty="0"/>
+              <a:t>    if button is not pressed, subtract 1 from </a:t>
+            </a:r>
+            <a:r>
+              <a:rPr lang="en-US" strike="sngStrike" dirty="0" err="1"/>
+              <a:t>heatcounter</a:t>
+            </a:r>
+            <a:endParaRPr lang="en-US" strike="sngStrike" dirty="0"/>
+          </a:p>
+          <a:p>
+            <a:r>
+              <a:rPr lang="en-US" strike="sngStrike" dirty="0"/>
+              <a:t> each 60 frames (n is 60 per second – if check required, set </a:t>
+            </a:r>
+            <a:r>
+              <a:rPr lang="en-US" strike="sngStrike" dirty="0" err="1"/>
+              <a:t>heatframe</a:t>
+            </a:r>
+            <a:r>
+              <a:rPr lang="en-US" strike="sngStrike" dirty="0"/>
+              <a:t> to zero), check to see if </a:t>
+            </a:r>
+            <a:r>
+              <a:rPr lang="en-US" strike="sngStrike" dirty="0" err="1"/>
+              <a:t>heatcounter</a:t>
+            </a:r>
+            <a:r>
+              <a:rPr lang="en-US" strike="sngStrike" dirty="0"/>
+              <a:t> &gt;= 60</a:t>
+            </a:r>
+          </a:p>
+          <a:p>
+            <a:r>
+              <a:rPr lang="en-US" strike="sngStrike" dirty="0"/>
+              <a:t> if </a:t>
+            </a:r>
+            <a:r>
+              <a:rPr lang="en-US" strike="sngStrike" dirty="0" err="1"/>
+              <a:t>heatcounter</a:t>
+            </a:r>
+            <a:r>
+              <a:rPr lang="en-US" strike="sngStrike" dirty="0"/>
+              <a:t> &gt;= 60 then increase level by </a:t>
+            </a:r>
+            <a:r>
+              <a:rPr lang="en-US" strike="sngStrike" dirty="0" err="1"/>
+              <a:t>heatuse</a:t>
+            </a:r>
+            <a:r>
+              <a:rPr lang="en-US" strike="sngStrike" dirty="0"/>
+              <a:t> and set n and </a:t>
+            </a:r>
+            <a:r>
+              <a:rPr lang="en-US" strike="sngStrike" dirty="0" err="1"/>
+              <a:t>heatcounter</a:t>
+            </a:r>
+            <a:r>
+              <a:rPr lang="en-US" strike="sngStrike" dirty="0"/>
+              <a:t> to zero.</a:t>
+            </a:r>
+          </a:p>
+          <a:p>
+            <a:r>
+              <a:rPr lang="en-US" strike="sngStrike" dirty="0"/>
+              <a:t>      else decrease level by </a:t>
+            </a:r>
+            <a:r>
+              <a:rPr lang="en-US" strike="sngStrike" dirty="0" err="1"/>
+              <a:t>heatuse</a:t>
+            </a:r>
+            <a:r>
+              <a:rPr lang="en-US" strike="sngStrike" dirty="0"/>
+              <a:t> and set n and </a:t>
+            </a:r>
+            <a:r>
+              <a:rPr lang="en-US" strike="sngStrike" dirty="0" err="1"/>
+              <a:t>heatcounter</a:t>
+            </a:r>
+            <a:r>
+              <a:rPr lang="en-US" strike="sngStrike" dirty="0"/>
+              <a:t> to zero.</a:t>
+            </a:r>
+          </a:p>
+          <a:p>
+            <a:r>
+              <a:rPr lang="en-US" dirty="0"/>
+              <a:t> </a:t>
+            </a:r>
+          </a:p>
+          <a:p>
+            <a:endParaRPr lang="en-US" dirty="0"/>
+          </a:p>
+          <a:p>
+            <a:r>
+              <a:rPr lang="en-US" dirty="0"/>
+              <a:t>NOTE THAT 60 will be variable once this works…..</a:t>
+            </a:r>
+          </a:p>
+        </p:txBody>
+      </p:sp>
+    </p:spTree>
+    <p:extLst>
+      <p:ext uri="{BB962C8B-B14F-4D97-AF65-F5344CB8AC3E}">
+        <p14:creationId xmlns:p14="http://schemas.microsoft.com/office/powerpoint/2010/main" val="595826134"/>
+      </p:ext>
+    </p:extLst>
+  </p:cSld>
+  <p:clrMapOvr>
+    <a:masterClrMapping/>
+  </p:clrMapOvr>
+</p:sld>
+</file>
+
+<file path=ppt/slides/slide4.xml><?xml version="1.0" encoding="utf-8"?>
+<p:sld xmlns:a="http://schemas.openxmlformats.org/drawingml/2006/main" xmlns:r="http://schemas.openxmlformats.org/officeDocument/2006/relationships" xmlns:p="http://schemas.openxmlformats.org/presentationml/2006/main">
+  <p:cSld>
+    <p:spTree>
+      <p:nvGrpSpPr>
+        <p:cNvPr id="1" name=""/>
+        <p:cNvGrpSpPr/>
+        <p:nvPr/>
+      </p:nvGrpSpPr>
+      <p:grpSpPr>
+        <a:xfrm>
+          <a:off x="0" y="0"/>
+          <a:ext cx="0" cy="0"/>
+          <a:chOff x="0" y="0"/>
+          <a:chExt cx="0" cy="0"/>
+        </a:xfrm>
+      </p:grpSpPr>
+      <p:pic>
+        <p:nvPicPr>
+          <p:cNvPr id="4" name="Picture 3">
+            <a:extLst>
+              <a:ext uri="{FF2B5EF4-FFF2-40B4-BE49-F238E27FC236}">
+                <a16:creationId xmlns:a16="http://schemas.microsoft.com/office/drawing/2014/main" id="{97FA9F14-EAFF-DF45-A538-0083B80F8E1E}"/>
+              </a:ext>
+            </a:extLst>
+          </p:cNvPr>
+          <p:cNvPicPr>
+            <a:picLocks noChangeAspect="1"/>
+          </p:cNvPicPr>
+          <p:nvPr/>
+        </p:nvPicPr>
+        <p:blipFill>
+          <a:blip r:embed="rId2"/>
+          <a:stretch>
+            <a:fillRect/>
+          </a:stretch>
+        </p:blipFill>
+        <p:spPr>
+          <a:xfrm>
+            <a:off x="304285" y="0"/>
+            <a:ext cx="3848100" cy="5397500"/>
+          </a:xfrm>
+          <a:prstGeom prst="rect">
+            <a:avLst/>
+          </a:prstGeom>
+          <a:solidFill>
+            <a:srgbClr val="FFFFFF">
+              <a:shade val="85000"/>
+            </a:srgbClr>
+          </a:solidFill>
+          <a:ln w="88900" cap="sq">
+            <a:solidFill>
+              <a:schemeClr val="tx1"/>
+            </a:solidFill>
+            <a:miter lim="800000"/>
+          </a:ln>
+          <a:effectLst>
+            <a:outerShdw blurRad="55000" dist="18000" dir="5400000" algn="tl" rotWithShape="0">
+              <a:srgbClr val="000000">
+                <a:alpha val="40000"/>
+              </a:srgbClr>
+            </a:outerShdw>
+          </a:effectLst>
+          <a:scene3d>
+            <a:camera prst="orthographicFront"/>
+            <a:lightRig rig="twoPt" dir="t">
+              <a:rot lat="0" lon="0" rev="7200000"/>
+            </a:lightRig>
+          </a:scene3d>
+          <a:sp3d>
+            <a:bevelT w="25400" h="19050"/>
+            <a:contourClr>
+              <a:srgbClr val="FFFFFF"/>
+            </a:contourClr>
+          </a:sp3d>
+        </p:spPr>
+      </p:pic>
+      <p:pic>
+        <p:nvPicPr>
+          <p:cNvPr id="5" name="Picture 4">
+            <a:extLst>
+              <a:ext uri="{FF2B5EF4-FFF2-40B4-BE49-F238E27FC236}">
+                <a16:creationId xmlns:a16="http://schemas.microsoft.com/office/drawing/2014/main" id="{F7DDC0BA-3405-3B4B-AF7A-D7D7548B843D}"/>
+              </a:ext>
+            </a:extLst>
+          </p:cNvPr>
+          <p:cNvPicPr>
+            <a:picLocks noChangeAspect="1"/>
+          </p:cNvPicPr>
+          <p:nvPr/>
+        </p:nvPicPr>
+        <p:blipFill>
+          <a:blip r:embed="rId3"/>
+          <a:stretch>
+            <a:fillRect/>
+          </a:stretch>
+        </p:blipFill>
+        <p:spPr>
+          <a:xfrm>
+            <a:off x="0" y="5375189"/>
+            <a:ext cx="8742989" cy="1482811"/>
+          </a:xfrm>
+          <a:prstGeom prst="rect">
+            <a:avLst/>
+          </a:prstGeom>
+        </p:spPr>
+      </p:pic>
+      <p:pic>
+        <p:nvPicPr>
+          <p:cNvPr id="6" name="Picture 5">
+            <a:extLst>
+              <a:ext uri="{FF2B5EF4-FFF2-40B4-BE49-F238E27FC236}">
+                <a16:creationId xmlns:a16="http://schemas.microsoft.com/office/drawing/2014/main" id="{CD103FE2-2460-7948-90F8-6B5A7E408904}"/>
+              </a:ext>
+            </a:extLst>
+          </p:cNvPr>
+          <p:cNvPicPr>
+            <a:picLocks noChangeAspect="1"/>
+          </p:cNvPicPr>
+          <p:nvPr/>
+        </p:nvPicPr>
+        <p:blipFill>
+          <a:blip r:embed="rId4"/>
+          <a:stretch>
+            <a:fillRect/>
+          </a:stretch>
+        </p:blipFill>
+        <p:spPr>
+          <a:xfrm>
+            <a:off x="7531100" y="4651289"/>
+            <a:ext cx="4660900" cy="723900"/>
+          </a:xfrm>
+          <a:prstGeom prst="rect">
+            <a:avLst/>
+          </a:prstGeom>
+        </p:spPr>
+      </p:pic>
+    </p:spTree>
+    <p:extLst>
+      <p:ext uri="{BB962C8B-B14F-4D97-AF65-F5344CB8AC3E}">
+        <p14:creationId xmlns:p14="http://schemas.microsoft.com/office/powerpoint/2010/main" val="2533942319"/>
+      </p:ext>
+    </p:extLst>
+  </p:cSld>
+  <p:clrMapOvr>
+    <a:masterClrMapping/>
+  </p:clrMapOvr>
+</p:sld>
+</file>
+
+<file path=ppt/slides/slide5.xml><?xml version="1.0" encoding="utf-8"?>
 <p:sld xmlns:a="http://schemas.openxmlformats.org/drawingml/2006/main" xmlns:r="http://schemas.openxmlformats.org/officeDocument/2006/relationships" xmlns:p="http://schemas.openxmlformats.org/presentationml/2006/main">
   <p:cSld>
     <p:bg>

</xml_diff>

<commit_message>
Explosion sound when the game ends
</commit_message>
<xml_diff>
--- a/notes.pptx
+++ b/notes.pptx
@@ -3827,10 +3827,10 @@
       </p:pic>
       <p:pic>
         <p:nvPicPr>
-          <p:cNvPr id="2" name="Picture 1">
-            <a:extLst>
-              <a:ext uri="{FF2B5EF4-FFF2-40B4-BE49-F238E27FC236}">
-                <a16:creationId xmlns:a16="http://schemas.microsoft.com/office/drawing/2014/main" id="{4EF3DBD6-0A6A-DE40-A49E-1E3FCCD25A22}"/>
+          <p:cNvPr id="7" name="Picture 6">
+            <a:extLst>
+              <a:ext uri="{FF2B5EF4-FFF2-40B4-BE49-F238E27FC236}">
+                <a16:creationId xmlns:a16="http://schemas.microsoft.com/office/drawing/2014/main" id="{7BF78418-B114-6440-A0ED-95D6EAB4FAA8}"/>
               </a:ext>
             </a:extLst>
           </p:cNvPr>
@@ -3847,38 +3847,8 @@
         </p:blipFill>
         <p:spPr>
           <a:xfrm>
-            <a:off x="3448706" y="-1"/>
-            <a:ext cx="8742989" cy="1482811"/>
-          </a:xfrm>
-          <a:prstGeom prst="rect">
-            <a:avLst/>
-          </a:prstGeom>
-        </p:spPr>
-      </p:pic>
-      <p:pic>
-        <p:nvPicPr>
-          <p:cNvPr id="3" name="Picture 2">
-            <a:extLst>
-              <a:ext uri="{FF2B5EF4-FFF2-40B4-BE49-F238E27FC236}">
-                <a16:creationId xmlns:a16="http://schemas.microsoft.com/office/drawing/2014/main" id="{AE9F0D44-7509-FE4E-AFB8-D55BF0DF3DE5}"/>
-              </a:ext>
-            </a:extLst>
-          </p:cNvPr>
-          <p:cNvPicPr>
-            <a:picLocks noChangeAspect="1"/>
-          </p:cNvPicPr>
-          <p:nvPr/>
-        </p:nvPicPr>
-        <p:blipFill>
-          <a:blip r:embed="rId4"/>
-          <a:stretch>
-            <a:fillRect/>
-          </a:stretch>
-        </p:blipFill>
-        <p:spPr>
-          <a:xfrm>
-            <a:off x="7468254" y="6069250"/>
-            <a:ext cx="4660900" cy="723900"/>
+            <a:off x="5533596" y="445530"/>
+            <a:ext cx="5499100" cy="406400"/>
           </a:xfrm>
           <a:prstGeom prst="rect">
             <a:avLst/>
@@ -4002,8 +3972,13 @@
           <a:p>
             <a:r>
               <a:rPr lang="en-US" dirty="0"/>
-              <a:t>Show score (height)</a:t>
-            </a:r>
+              <a:t>Show score (height – only counts if finger </a:t>
+            </a:r>
+            <a:r>
+              <a:rPr lang="en-US"/>
+              <a:t>on button)</a:t>
+            </a:r>
+            <a:endParaRPr lang="en-US" dirty="0"/>
           </a:p>
           <a:p>
             <a:r>
@@ -4156,7 +4131,7 @@
           <a:lstStyle/>
           <a:p>
             <a:r>
-              <a:rPr lang="en-US" dirty="0"/>
+              <a:rPr lang="en-US" strike="sngStrike" dirty="0"/>
               <a:t>When power is not applied. heat should drop back – think this works.</a:t>
             </a:r>
           </a:p>
@@ -4165,7 +4140,7 @@
           </a:p>
           <a:p>
             <a:r>
-              <a:rPr lang="en-US" b="1" dirty="0"/>
+              <a:rPr lang="en-US" b="1" strike="sngStrike" dirty="0"/>
               <a:t>Heat</a:t>
             </a:r>
           </a:p>
@@ -4370,7 +4345,7 @@
         </p:blipFill>
         <p:spPr>
           <a:xfrm>
-            <a:off x="304285" y="0"/>
+            <a:off x="1368826" y="922096"/>
             <a:ext cx="3848100" cy="5397500"/>
           </a:xfrm>
           <a:prstGeom prst="rect">
@@ -4408,12 +4383,51 @@
           </a:sp3d>
         </p:spPr>
       </p:pic>
+      <p:sp>
+        <p:nvSpPr>
+          <p:cNvPr id="3" name="Rectangle 2">
+            <a:extLst>
+              <a:ext uri="{FF2B5EF4-FFF2-40B4-BE49-F238E27FC236}">
+                <a16:creationId xmlns:a16="http://schemas.microsoft.com/office/drawing/2014/main" id="{32366023-600B-394B-8E20-525E3C4364AE}"/>
+              </a:ext>
+            </a:extLst>
+          </p:cNvPr>
+          <p:cNvSpPr/>
+          <p:nvPr/>
+        </p:nvSpPr>
+        <p:spPr>
+          <a:xfrm>
+            <a:off x="4558447" y="291069"/>
+            <a:ext cx="5719451" cy="369332"/>
+          </a:xfrm>
+          <a:prstGeom prst="rect">
+            <a:avLst/>
+          </a:prstGeom>
+        </p:spPr>
+        <p:txBody>
+          <a:bodyPr wrap="none">
+            <a:spAutoFit/>
+          </a:bodyPr>
+          <a:lstStyle/>
+          <a:p>
+            <a:r>
+              <a:rPr lang="en-US" dirty="0"/>
+              <a:t>https://www.1001fonts.com/</a:t>
+            </a:r>
+            <a:r>
+              <a:rPr lang="en-US" dirty="0" err="1"/>
+              <a:t>homoarakhn-font.html#styles</a:t>
+            </a:r>
+            <a:endParaRPr lang="en-US" dirty="0"/>
+          </a:p>
+        </p:txBody>
+      </p:sp>
       <p:pic>
         <p:nvPicPr>
-          <p:cNvPr id="5" name="Picture 4">
-            <a:extLst>
-              <a:ext uri="{FF2B5EF4-FFF2-40B4-BE49-F238E27FC236}">
-                <a16:creationId xmlns:a16="http://schemas.microsoft.com/office/drawing/2014/main" id="{F7DDC0BA-3405-3B4B-AF7A-D7D7548B843D}"/>
+          <p:cNvPr id="8" name="Picture 7">
+            <a:extLst>
+              <a:ext uri="{FF2B5EF4-FFF2-40B4-BE49-F238E27FC236}">
+                <a16:creationId xmlns:a16="http://schemas.microsoft.com/office/drawing/2014/main" id="{7DBDBA09-3C09-E247-9C73-D659F409EF82}"/>
               </a:ext>
             </a:extLst>
           </p:cNvPr>
@@ -4430,8 +4444,8 @@
         </p:blipFill>
         <p:spPr>
           <a:xfrm>
-            <a:off x="0" y="5375189"/>
-            <a:ext cx="8742989" cy="1482811"/>
+            <a:off x="4405356" y="1489504"/>
+            <a:ext cx="6692900" cy="419100"/>
           </a:xfrm>
           <a:prstGeom prst="rect">
             <a:avLst/>
@@ -4440,10 +4454,10 @@
       </p:pic>
       <p:pic>
         <p:nvPicPr>
-          <p:cNvPr id="6" name="Picture 5">
-            <a:extLst>
-              <a:ext uri="{FF2B5EF4-FFF2-40B4-BE49-F238E27FC236}">
-                <a16:creationId xmlns:a16="http://schemas.microsoft.com/office/drawing/2014/main" id="{CD103FE2-2460-7948-90F8-6B5A7E408904}"/>
+          <p:cNvPr id="15" name="Picture 14">
+            <a:extLst>
+              <a:ext uri="{FF2B5EF4-FFF2-40B4-BE49-F238E27FC236}">
+                <a16:creationId xmlns:a16="http://schemas.microsoft.com/office/drawing/2014/main" id="{5D5096E7-AB55-C147-8FD3-C79A0B72C195}"/>
               </a:ext>
             </a:extLst>
           </p:cNvPr>
@@ -4460,14 +4474,449 @@
         </p:blipFill>
         <p:spPr>
           <a:xfrm>
-            <a:off x="7531100" y="4651289"/>
-            <a:ext cx="4660900" cy="723900"/>
+            <a:off x="5178207" y="864493"/>
+            <a:ext cx="5499100" cy="406400"/>
           </a:xfrm>
           <a:prstGeom prst="rect">
             <a:avLst/>
           </a:prstGeom>
         </p:spPr>
       </p:pic>
+      <p:pic>
+        <p:nvPicPr>
+          <p:cNvPr id="19" name="Picture 18">
+            <a:extLst>
+              <a:ext uri="{FF2B5EF4-FFF2-40B4-BE49-F238E27FC236}">
+                <a16:creationId xmlns:a16="http://schemas.microsoft.com/office/drawing/2014/main" id="{8AA8C3A5-D34F-F442-B60C-A891DC2A68CD}"/>
+              </a:ext>
+            </a:extLst>
+          </p:cNvPr>
+          <p:cNvPicPr>
+            <a:picLocks noChangeAspect="1"/>
+          </p:cNvPicPr>
+          <p:nvPr/>
+        </p:nvPicPr>
+        <p:blipFill>
+          <a:blip r:embed="rId4"/>
+          <a:stretch>
+            <a:fillRect/>
+          </a:stretch>
+        </p:blipFill>
+        <p:spPr>
+          <a:xfrm>
+            <a:off x="9540755" y="3553613"/>
+            <a:ext cx="1819507" cy="134467"/>
+          </a:xfrm>
+          <a:prstGeom prst="rect">
+            <a:avLst/>
+          </a:prstGeom>
+        </p:spPr>
+      </p:pic>
+      <p:pic>
+        <p:nvPicPr>
+          <p:cNvPr id="20" name="Picture 19">
+            <a:extLst>
+              <a:ext uri="{FF2B5EF4-FFF2-40B4-BE49-F238E27FC236}">
+                <a16:creationId xmlns:a16="http://schemas.microsoft.com/office/drawing/2014/main" id="{EC22F6E6-F1EF-7247-B85C-8A4742AEE5AF}"/>
+              </a:ext>
+            </a:extLst>
+          </p:cNvPr>
+          <p:cNvPicPr>
+            <a:picLocks noChangeAspect="1"/>
+          </p:cNvPicPr>
+          <p:nvPr/>
+        </p:nvPicPr>
+        <p:blipFill>
+          <a:blip r:embed="rId4"/>
+          <a:stretch>
+            <a:fillRect/>
+          </a:stretch>
+        </p:blipFill>
+        <p:spPr>
+          <a:xfrm>
+            <a:off x="9693155" y="3706013"/>
+            <a:ext cx="1819507" cy="134467"/>
+          </a:xfrm>
+          <a:prstGeom prst="rect">
+            <a:avLst/>
+          </a:prstGeom>
+        </p:spPr>
+      </p:pic>
+      <p:pic>
+        <p:nvPicPr>
+          <p:cNvPr id="21" name="Picture 20">
+            <a:extLst>
+              <a:ext uri="{FF2B5EF4-FFF2-40B4-BE49-F238E27FC236}">
+                <a16:creationId xmlns:a16="http://schemas.microsoft.com/office/drawing/2014/main" id="{E5BD9032-B593-5E4C-B253-5E8E7206D831}"/>
+              </a:ext>
+            </a:extLst>
+          </p:cNvPr>
+          <p:cNvPicPr>
+            <a:picLocks noChangeAspect="1"/>
+          </p:cNvPicPr>
+          <p:nvPr/>
+        </p:nvPicPr>
+        <p:blipFill>
+          <a:blip r:embed="rId4"/>
+          <a:stretch>
+            <a:fillRect/>
+          </a:stretch>
+        </p:blipFill>
+        <p:spPr>
+          <a:xfrm>
+            <a:off x="9845555" y="3858413"/>
+            <a:ext cx="1819507" cy="134467"/>
+          </a:xfrm>
+          <a:prstGeom prst="rect">
+            <a:avLst/>
+          </a:prstGeom>
+        </p:spPr>
+      </p:pic>
+      <p:pic>
+        <p:nvPicPr>
+          <p:cNvPr id="22" name="Picture 21">
+            <a:extLst>
+              <a:ext uri="{FF2B5EF4-FFF2-40B4-BE49-F238E27FC236}">
+                <a16:creationId xmlns:a16="http://schemas.microsoft.com/office/drawing/2014/main" id="{2E3146DA-3D8D-2B46-BA47-89F123372303}"/>
+              </a:ext>
+            </a:extLst>
+          </p:cNvPr>
+          <p:cNvPicPr>
+            <a:picLocks noChangeAspect="1"/>
+          </p:cNvPicPr>
+          <p:nvPr/>
+        </p:nvPicPr>
+        <p:blipFill>
+          <a:blip r:embed="rId4"/>
+          <a:stretch>
+            <a:fillRect/>
+          </a:stretch>
+        </p:blipFill>
+        <p:spPr>
+          <a:xfrm>
+            <a:off x="9997955" y="4010813"/>
+            <a:ext cx="1819507" cy="134467"/>
+          </a:xfrm>
+          <a:prstGeom prst="rect">
+            <a:avLst/>
+          </a:prstGeom>
+        </p:spPr>
+      </p:pic>
+      <p:pic>
+        <p:nvPicPr>
+          <p:cNvPr id="23" name="Picture 22">
+            <a:extLst>
+              <a:ext uri="{FF2B5EF4-FFF2-40B4-BE49-F238E27FC236}">
+                <a16:creationId xmlns:a16="http://schemas.microsoft.com/office/drawing/2014/main" id="{8EA95F41-7656-9045-B35C-34FEF8402B71}"/>
+              </a:ext>
+            </a:extLst>
+          </p:cNvPr>
+          <p:cNvPicPr>
+            <a:picLocks noChangeAspect="1"/>
+          </p:cNvPicPr>
+          <p:nvPr/>
+        </p:nvPicPr>
+        <p:blipFill>
+          <a:blip r:embed="rId4"/>
+          <a:stretch>
+            <a:fillRect/>
+          </a:stretch>
+        </p:blipFill>
+        <p:spPr>
+          <a:xfrm>
+            <a:off x="10150355" y="4163213"/>
+            <a:ext cx="1819507" cy="134467"/>
+          </a:xfrm>
+          <a:prstGeom prst="rect">
+            <a:avLst/>
+          </a:prstGeom>
+        </p:spPr>
+      </p:pic>
+      <p:grpSp>
+        <p:nvGrpSpPr>
+          <p:cNvPr id="25" name="Group 24">
+            <a:extLst>
+              <a:ext uri="{FF2B5EF4-FFF2-40B4-BE49-F238E27FC236}">
+                <a16:creationId xmlns:a16="http://schemas.microsoft.com/office/drawing/2014/main" id="{9FDF0BB4-D2EF-6F4E-8A7F-7E980A0AA48E}"/>
+              </a:ext>
+            </a:extLst>
+          </p:cNvPr>
+          <p:cNvGrpSpPr>
+            <a:grpSpLocks/>
+          </p:cNvGrpSpPr>
+          <p:nvPr/>
+        </p:nvGrpSpPr>
+        <p:grpSpPr>
+          <a:xfrm>
+            <a:off x="4782065" y="2128794"/>
+            <a:ext cx="3962400" cy="3962400"/>
+            <a:chOff x="4782065" y="2128794"/>
+            <a:chExt cx="3962400" cy="3962400"/>
+          </a:xfrm>
+        </p:grpSpPr>
+        <p:pic>
+          <p:nvPicPr>
+            <p:cNvPr id="9" name="Picture 8">
+              <a:extLst>
+                <a:ext uri="{FF2B5EF4-FFF2-40B4-BE49-F238E27FC236}">
+                  <a16:creationId xmlns:a16="http://schemas.microsoft.com/office/drawing/2014/main" id="{B9515765-9959-0F4E-98C4-9641EE88E032}"/>
+                </a:ext>
+              </a:extLst>
+            </p:cNvPr>
+            <p:cNvPicPr>
+              <a:picLocks noChangeAspect="1"/>
+            </p:cNvPicPr>
+            <p:nvPr/>
+          </p:nvPicPr>
+          <p:blipFill>
+            <a:blip r:embed="rId5"/>
+            <a:stretch>
+              <a:fillRect/>
+            </a:stretch>
+          </p:blipFill>
+          <p:spPr>
+            <a:xfrm>
+              <a:off x="4782065" y="2128794"/>
+              <a:ext cx="3962400" cy="3962400"/>
+            </a:xfrm>
+            <a:prstGeom prst="rect">
+              <a:avLst/>
+            </a:prstGeom>
+          </p:spPr>
+        </p:pic>
+        <p:pic>
+          <p:nvPicPr>
+            <p:cNvPr id="11" name="Picture 10">
+              <a:extLst>
+                <a:ext uri="{FF2B5EF4-FFF2-40B4-BE49-F238E27FC236}">
+                  <a16:creationId xmlns:a16="http://schemas.microsoft.com/office/drawing/2014/main" id="{850E4BE6-F37A-CF43-9CF6-0AD121A076F9}"/>
+                </a:ext>
+              </a:extLst>
+            </p:cNvPr>
+            <p:cNvPicPr>
+              <a:picLocks noChangeAspect="1"/>
+            </p:cNvPicPr>
+            <p:nvPr/>
+          </p:nvPicPr>
+          <p:blipFill rotWithShape="1">
+            <a:blip r:embed="rId5"/>
+            <a:srcRect l="31118" t="28279" r="56821" b="66930"/>
+            <a:stretch/>
+          </p:blipFill>
+          <p:spPr>
+            <a:xfrm>
+              <a:off x="6013216" y="3405480"/>
+              <a:ext cx="477896" cy="461670"/>
+            </a:xfrm>
+            <a:prstGeom prst="rect">
+              <a:avLst/>
+            </a:prstGeom>
+          </p:spPr>
+        </p:pic>
+        <p:pic>
+          <p:nvPicPr>
+            <p:cNvPr id="13" name="Picture 12">
+              <a:extLst>
+                <a:ext uri="{FF2B5EF4-FFF2-40B4-BE49-F238E27FC236}">
+                  <a16:creationId xmlns:a16="http://schemas.microsoft.com/office/drawing/2014/main" id="{62904B74-1EDA-5A42-80D7-32F29DD76485}"/>
+                </a:ext>
+              </a:extLst>
+            </p:cNvPr>
+            <p:cNvPicPr>
+              <a:picLocks noChangeAspect="1"/>
+            </p:cNvPicPr>
+            <p:nvPr/>
+          </p:nvPicPr>
+          <p:blipFill rotWithShape="1">
+            <a:blip r:embed="rId5"/>
+            <a:srcRect l="34682" t="48678" r="61151" b="48948"/>
+            <a:stretch/>
+          </p:blipFill>
+          <p:spPr>
+            <a:xfrm>
+              <a:off x="6156914" y="3962400"/>
+              <a:ext cx="165100" cy="194618"/>
+            </a:xfrm>
+            <a:prstGeom prst="rect">
+              <a:avLst/>
+            </a:prstGeom>
+          </p:spPr>
+        </p:pic>
+        <p:pic>
+          <p:nvPicPr>
+            <p:cNvPr id="14" name="Picture 13">
+              <a:extLst>
+                <a:ext uri="{FF2B5EF4-FFF2-40B4-BE49-F238E27FC236}">
+                  <a16:creationId xmlns:a16="http://schemas.microsoft.com/office/drawing/2014/main" id="{843F485D-594A-5B4E-9E75-179165E68F69}"/>
+                </a:ext>
+              </a:extLst>
+            </p:cNvPr>
+            <p:cNvPicPr>
+              <a:picLocks noChangeAspect="1"/>
+            </p:cNvPicPr>
+            <p:nvPr/>
+          </p:nvPicPr>
+          <p:blipFill rotWithShape="1">
+            <a:blip r:embed="rId5"/>
+            <a:srcRect l="34682" t="48678" r="61151" b="48948"/>
+            <a:stretch/>
+          </p:blipFill>
+          <p:spPr>
+            <a:xfrm>
+              <a:off x="6168321" y="3912201"/>
+              <a:ext cx="142286" cy="194618"/>
+            </a:xfrm>
+            <a:prstGeom prst="rect">
+              <a:avLst/>
+            </a:prstGeom>
+          </p:spPr>
+        </p:pic>
+        <p:pic>
+          <p:nvPicPr>
+            <p:cNvPr id="7" name="Picture 6">
+              <a:extLst>
+                <a:ext uri="{FF2B5EF4-FFF2-40B4-BE49-F238E27FC236}">
+                  <a16:creationId xmlns:a16="http://schemas.microsoft.com/office/drawing/2014/main" id="{AF741A8B-2F5D-AA45-A5DA-E0CE0ACD633F}"/>
+                </a:ext>
+              </a:extLst>
+            </p:cNvPr>
+            <p:cNvPicPr>
+              <a:picLocks noChangeAspect="1"/>
+            </p:cNvPicPr>
+            <p:nvPr/>
+          </p:nvPicPr>
+          <p:blipFill rotWithShape="1">
+            <a:blip r:embed="rId4"/>
+            <a:srcRect l="42115" t="3078" r="45463" b="-15010"/>
+            <a:stretch/>
+          </p:blipFill>
+          <p:spPr>
+            <a:xfrm>
+              <a:off x="6139157" y="3111990"/>
+              <a:ext cx="226015" cy="150511"/>
+            </a:xfrm>
+            <a:prstGeom prst="rect">
+              <a:avLst/>
+            </a:prstGeom>
+          </p:spPr>
+        </p:pic>
+        <p:pic>
+          <p:nvPicPr>
+            <p:cNvPr id="16" name="Picture 15">
+              <a:extLst>
+                <a:ext uri="{FF2B5EF4-FFF2-40B4-BE49-F238E27FC236}">
+                  <a16:creationId xmlns:a16="http://schemas.microsoft.com/office/drawing/2014/main" id="{E8B868F9-70E0-494B-B21F-43B93F788D26}"/>
+                </a:ext>
+              </a:extLst>
+            </p:cNvPr>
+            <p:cNvPicPr>
+              <a:picLocks noChangeAspect="1"/>
+            </p:cNvPicPr>
+            <p:nvPr/>
+          </p:nvPicPr>
+          <p:blipFill rotWithShape="1">
+            <a:blip r:embed="rId4"/>
+            <a:srcRect l="54550" r="31436" b="-11931"/>
+            <a:stretch/>
+          </p:blipFill>
+          <p:spPr>
+            <a:xfrm>
+              <a:off x="6124674" y="3254970"/>
+              <a:ext cx="254980" cy="150510"/>
+            </a:xfrm>
+            <a:prstGeom prst="rect">
+              <a:avLst/>
+            </a:prstGeom>
+          </p:spPr>
+        </p:pic>
+        <p:pic>
+          <p:nvPicPr>
+            <p:cNvPr id="17" name="Picture 16">
+              <a:extLst>
+                <a:ext uri="{FF2B5EF4-FFF2-40B4-BE49-F238E27FC236}">
+                  <a16:creationId xmlns:a16="http://schemas.microsoft.com/office/drawing/2014/main" id="{632BB051-0C5C-A844-BD2B-1FA65C683841}"/>
+                </a:ext>
+              </a:extLst>
+            </p:cNvPr>
+            <p:cNvPicPr>
+              <a:picLocks noChangeAspect="1"/>
+            </p:cNvPicPr>
+            <p:nvPr/>
+          </p:nvPicPr>
+          <p:blipFill rotWithShape="1">
+            <a:blip r:embed="rId4"/>
+            <a:srcRect l="69213" t="-11930" r="16772"/>
+            <a:stretch/>
+          </p:blipFill>
+          <p:spPr>
+            <a:xfrm>
+              <a:off x="6124674" y="3388590"/>
+              <a:ext cx="254980" cy="150510"/>
+            </a:xfrm>
+            <a:prstGeom prst="rect">
+              <a:avLst/>
+            </a:prstGeom>
+          </p:spPr>
+        </p:pic>
+        <p:pic>
+          <p:nvPicPr>
+            <p:cNvPr id="18" name="Picture 17">
+              <a:extLst>
+                <a:ext uri="{FF2B5EF4-FFF2-40B4-BE49-F238E27FC236}">
+                  <a16:creationId xmlns:a16="http://schemas.microsoft.com/office/drawing/2014/main" id="{F6099027-460B-0441-9911-65CB7839A5FC}"/>
+                </a:ext>
+              </a:extLst>
+            </p:cNvPr>
+            <p:cNvPicPr>
+              <a:picLocks noChangeAspect="1"/>
+            </p:cNvPicPr>
+            <p:nvPr/>
+          </p:nvPicPr>
+          <p:blipFill rotWithShape="1">
+            <a:blip r:embed="rId4"/>
+            <a:srcRect l="83870" t="-5281" r="11942" b="-6651"/>
+            <a:stretch/>
+          </p:blipFill>
+          <p:spPr>
+            <a:xfrm>
+              <a:off x="6214064" y="3511470"/>
+              <a:ext cx="76200" cy="150510"/>
+            </a:xfrm>
+            <a:prstGeom prst="rect">
+              <a:avLst/>
+            </a:prstGeom>
+          </p:spPr>
+        </p:pic>
+        <p:pic>
+          <p:nvPicPr>
+            <p:cNvPr id="24" name="Picture 23">
+              <a:extLst>
+                <a:ext uri="{FF2B5EF4-FFF2-40B4-BE49-F238E27FC236}">
+                  <a16:creationId xmlns:a16="http://schemas.microsoft.com/office/drawing/2014/main" id="{DBFB2991-C0CB-9744-BBC9-B80CDA575A49}"/>
+                </a:ext>
+              </a:extLst>
+            </p:cNvPr>
+            <p:cNvPicPr>
+              <a:picLocks noChangeAspect="1"/>
+            </p:cNvPicPr>
+            <p:nvPr/>
+          </p:nvPicPr>
+          <p:blipFill rotWithShape="1">
+            <a:blip r:embed="rId4"/>
+            <a:srcRect l="88784" t="-11929" b="-11932"/>
+            <a:stretch/>
+          </p:blipFill>
+          <p:spPr>
+            <a:xfrm>
+              <a:off x="6150112" y="3677780"/>
+              <a:ext cx="204104" cy="166552"/>
+            </a:xfrm>
+            <a:prstGeom prst="rect">
+              <a:avLst/>
+            </a:prstGeom>
+          </p:spPr>
+        </p:pic>
+      </p:grpSp>
     </p:spTree>
     <p:extLst>
       <p:ext uri="{BB962C8B-B14F-4D97-AF65-F5344CB8AC3E}">

</xml_diff>

<commit_message>
More work on title screen, changed rocket sprite, fixed numerous bugs
</commit_message>
<xml_diff>
--- a/notes.pptx
+++ b/notes.pptx
@@ -7,9 +7,10 @@
   <p:sldIdLst>
     <p:sldId id="256" r:id="rId2"/>
     <p:sldId id="258" r:id="rId3"/>
-    <p:sldId id="260" r:id="rId4"/>
-    <p:sldId id="259" r:id="rId5"/>
-    <p:sldId id="257" r:id="rId6"/>
+    <p:sldId id="261" r:id="rId4"/>
+    <p:sldId id="260" r:id="rId5"/>
+    <p:sldId id="259" r:id="rId6"/>
+    <p:sldId id="257" r:id="rId7"/>
   </p:sldIdLst>
   <p:sldSz cx="12192000" cy="6858000"/>
   <p:notesSz cx="6858000" cy="9144000"/>
@@ -265,7 +266,7 @@
           <a:p>
             <a:fld id="{2520F6F4-E946-1746-9921-C7E20A3E8025}" type="datetimeFigureOut">
               <a:rPr lang="en-US" smtClean="0"/>
-              <a:t>3/20/20</a:t>
+              <a:t>3/25/20</a:t>
             </a:fld>
             <a:endParaRPr lang="en-US"/>
           </a:p>
@@ -465,7 +466,7 @@
           <a:p>
             <a:fld id="{2520F6F4-E946-1746-9921-C7E20A3E8025}" type="datetimeFigureOut">
               <a:rPr lang="en-US" smtClean="0"/>
-              <a:t>3/20/20</a:t>
+              <a:t>3/25/20</a:t>
             </a:fld>
             <a:endParaRPr lang="en-US"/>
           </a:p>
@@ -675,7 +676,7 @@
           <a:p>
             <a:fld id="{2520F6F4-E946-1746-9921-C7E20A3E8025}" type="datetimeFigureOut">
               <a:rPr lang="en-US" smtClean="0"/>
-              <a:t>3/20/20</a:t>
+              <a:t>3/25/20</a:t>
             </a:fld>
             <a:endParaRPr lang="en-US"/>
           </a:p>
@@ -875,7 +876,7 @@
           <a:p>
             <a:fld id="{2520F6F4-E946-1746-9921-C7E20A3E8025}" type="datetimeFigureOut">
               <a:rPr lang="en-US" smtClean="0"/>
-              <a:t>3/20/20</a:t>
+              <a:t>3/25/20</a:t>
             </a:fld>
             <a:endParaRPr lang="en-US"/>
           </a:p>
@@ -1151,7 +1152,7 @@
           <a:p>
             <a:fld id="{2520F6F4-E946-1746-9921-C7E20A3E8025}" type="datetimeFigureOut">
               <a:rPr lang="en-US" smtClean="0"/>
-              <a:t>3/20/20</a:t>
+              <a:t>3/25/20</a:t>
             </a:fld>
             <a:endParaRPr lang="en-US"/>
           </a:p>
@@ -1419,7 +1420,7 @@
           <a:p>
             <a:fld id="{2520F6F4-E946-1746-9921-C7E20A3E8025}" type="datetimeFigureOut">
               <a:rPr lang="en-US" smtClean="0"/>
-              <a:t>3/20/20</a:t>
+              <a:t>3/25/20</a:t>
             </a:fld>
             <a:endParaRPr lang="en-US"/>
           </a:p>
@@ -1834,7 +1835,7 @@
           <a:p>
             <a:fld id="{2520F6F4-E946-1746-9921-C7E20A3E8025}" type="datetimeFigureOut">
               <a:rPr lang="en-US" smtClean="0"/>
-              <a:t>3/20/20</a:t>
+              <a:t>3/25/20</a:t>
             </a:fld>
             <a:endParaRPr lang="en-US"/>
           </a:p>
@@ -1976,7 +1977,7 @@
           <a:p>
             <a:fld id="{2520F6F4-E946-1746-9921-C7E20A3E8025}" type="datetimeFigureOut">
               <a:rPr lang="en-US" smtClean="0"/>
-              <a:t>3/20/20</a:t>
+              <a:t>3/25/20</a:t>
             </a:fld>
             <a:endParaRPr lang="en-US"/>
           </a:p>
@@ -2089,7 +2090,7 @@
           <a:p>
             <a:fld id="{2520F6F4-E946-1746-9921-C7E20A3E8025}" type="datetimeFigureOut">
               <a:rPr lang="en-US" smtClean="0"/>
-              <a:t>3/20/20</a:t>
+              <a:t>3/25/20</a:t>
             </a:fld>
             <a:endParaRPr lang="en-US"/>
           </a:p>
@@ -2402,7 +2403,7 @@
           <a:p>
             <a:fld id="{2520F6F4-E946-1746-9921-C7E20A3E8025}" type="datetimeFigureOut">
               <a:rPr lang="en-US" smtClean="0"/>
-              <a:t>3/20/20</a:t>
+              <a:t>3/25/20</a:t>
             </a:fld>
             <a:endParaRPr lang="en-US"/>
           </a:p>
@@ -2691,7 +2692,7 @@
           <a:p>
             <a:fld id="{2520F6F4-E946-1746-9921-C7E20A3E8025}" type="datetimeFigureOut">
               <a:rPr lang="en-US" smtClean="0"/>
-              <a:t>3/20/20</a:t>
+              <a:t>3/25/20</a:t>
             </a:fld>
             <a:endParaRPr lang="en-US"/>
           </a:p>
@@ -2934,7 +2935,7 @@
           <a:p>
             <a:fld id="{2520F6F4-E946-1746-9921-C7E20A3E8025}" type="datetimeFigureOut">
               <a:rPr lang="en-US" smtClean="0"/>
-              <a:t>3/20/20</a:t>
+              <a:t>3/25/20</a:t>
             </a:fld>
             <a:endParaRPr lang="en-US"/>
           </a:p>
@@ -3938,47 +3939,62 @@
           <a:p>
             <a:r>
               <a:rPr lang="en-US" dirty="0"/>
+              <a:t>Show score (60 ticks =10 </a:t>
+            </a:r>
+            <a:r>
+              <a:rPr lang="en-US" dirty="0" err="1"/>
+              <a:t>metres</a:t>
+            </a:r>
+            <a:r>
+              <a:rPr lang="en-US" dirty="0"/>
+              <a:t> – only counts if finger on button)</a:t>
+            </a:r>
+          </a:p>
+          <a:p>
+            <a:r>
+              <a:rPr lang="en-US" dirty="0"/>
+              <a:t>Explosion for end game</a:t>
+            </a:r>
+          </a:p>
+          <a:p>
+            <a:r>
+              <a:rPr lang="en-US" dirty="0"/>
+              <a:t>Sky </a:t>
+            </a:r>
+            <a:r>
+              <a:rPr lang="en-US" dirty="0" err="1"/>
+              <a:t>colour</a:t>
+            </a:r>
+            <a:r>
+              <a:rPr lang="en-US" dirty="0"/>
+              <a:t> – STARTED</a:t>
+            </a:r>
+          </a:p>
+          <a:p>
+            <a:r>
+              <a:rPr lang="en-US" dirty="0"/>
+              <a:t>Finish start screen with </a:t>
+            </a:r>
+            <a:r>
+              <a:rPr lang="en-US" dirty="0" err="1"/>
+              <a:t>skyrokit</a:t>
+            </a:r>
+            <a:r>
+              <a:rPr lang="en-US" dirty="0"/>
+              <a:t> logo and copyright image</a:t>
+            </a:r>
+          </a:p>
+          <a:p>
+            <a:r>
+              <a:rPr lang="en-US" dirty="0"/>
               <a:t>Make starfield start blank, then steadily increase the amount of stars</a:t>
             </a:r>
           </a:p>
           <a:p>
             <a:r>
-              <a:rPr lang="en-US" dirty="0"/>
-              <a:t>Show launchpad</a:t>
-            </a:r>
-          </a:p>
-          <a:p>
-            <a:r>
               <a:rPr lang="en-US" strike="sngStrike" dirty="0"/>
-              <a:t>Allow rocket to drop back when no button is pressed </a:t>
-            </a:r>
-            <a:r>
-              <a:rPr lang="en-US" dirty="0"/>
-              <a:t>(along with a corresponding delay to the starfield)</a:t>
-            </a:r>
-          </a:p>
-          <a:p>
-            <a:r>
-              <a:rPr lang="en-US" strike="sngStrike" dirty="0"/>
-              <a:t>Show fuel</a:t>
-            </a:r>
-          </a:p>
-          <a:p>
-            <a:r>
-              <a:rPr lang="en-US" strike="sngStrike" dirty="0"/>
-              <a:t>Show heat</a:t>
-            </a:r>
-          </a:p>
-          <a:p>
-            <a:r>
-              <a:rPr lang="en-US" dirty="0"/>
-              <a:t>Show score (height – only counts if finger </a:t>
-            </a:r>
-            <a:r>
-              <a:rPr lang="en-US"/>
-              <a:t>on button)</a:t>
-            </a:r>
-            <a:endParaRPr lang="en-US" dirty="0"/>
+              <a:t>Make rocket able to go higher on the screen</a:t>
+            </a:r>
           </a:p>
           <a:p>
             <a:r>
@@ -3995,6 +4011,12 @@
           <a:p>
             <a:r>
               <a:rPr lang="en-US" dirty="0"/>
+              <a:t>Add things to bump into and kill you or hurt you</a:t>
+            </a:r>
+          </a:p>
+          <a:p>
+            <a:r>
+              <a:rPr lang="en-US" dirty="0"/>
               <a:t>Possibly add left and right steering…..</a:t>
             </a:r>
           </a:p>
@@ -4020,26 +4042,6 @@
             <a:r>
               <a:rPr lang="en-US" dirty="0"/>
               <a:t>Different rockets </a:t>
-            </a:r>
-          </a:p>
-          <a:p>
-            <a:r>
-              <a:rPr lang="en-US" dirty="0"/>
-              <a:t>Sky </a:t>
-            </a:r>
-            <a:r>
-              <a:rPr lang="en-US" dirty="0" err="1"/>
-              <a:t>colour</a:t>
-            </a:r>
-            <a:r>
-              <a:rPr lang="en-US" dirty="0"/>
-              <a:t> - STARTED</a:t>
-            </a:r>
-          </a:p>
-          <a:p>
-            <a:r>
-              <a:rPr lang="en-US" dirty="0"/>
-              <a:t>When rocket dropping back, fuel stops, but when it hits the bottom of the screen, it should explode…..</a:t>
             </a:r>
           </a:p>
         </p:txBody>
@@ -4097,6 +4099,123 @@
           <a:p>
             <a:r>
               <a:rPr lang="en-US" dirty="0"/>
+              <a:t>Done	</a:t>
+            </a:r>
+          </a:p>
+        </p:txBody>
+      </p:sp>
+      <p:sp>
+        <p:nvSpPr>
+          <p:cNvPr id="3" name="Content Placeholder 2">
+            <a:extLst>
+              <a:ext uri="{FF2B5EF4-FFF2-40B4-BE49-F238E27FC236}">
+                <a16:creationId xmlns:a16="http://schemas.microsoft.com/office/drawing/2014/main" id="{8C47E09D-E5D1-1543-961B-36B8CE3D2691}"/>
+              </a:ext>
+            </a:extLst>
+          </p:cNvPr>
+          <p:cNvSpPr>
+            <a:spLocks noGrp="1"/>
+          </p:cNvSpPr>
+          <p:nvPr>
+            <p:ph idx="1"/>
+          </p:nvPr>
+        </p:nvSpPr>
+        <p:spPr/>
+        <p:txBody>
+          <a:bodyPr>
+            <a:normAutofit/>
+          </a:bodyPr>
+          <a:lstStyle/>
+          <a:p>
+            <a:r>
+              <a:rPr lang="en-US" strike="sngStrike" dirty="0"/>
+              <a:t>Show launchpad</a:t>
+            </a:r>
+            <a:endParaRPr lang="en-US" dirty="0"/>
+          </a:p>
+          <a:p>
+            <a:r>
+              <a:rPr lang="en-US" strike="sngStrike" dirty="0"/>
+              <a:t>Allow rocket to drop back when no button is pressed </a:t>
+            </a:r>
+            <a:r>
+              <a:rPr lang="en-US" dirty="0"/>
+              <a:t>(along with a corresponding delay to the starfield)</a:t>
+            </a:r>
+          </a:p>
+          <a:p>
+            <a:r>
+              <a:rPr lang="en-US" strike="sngStrike" dirty="0"/>
+              <a:t>Show fuel</a:t>
+            </a:r>
+          </a:p>
+          <a:p>
+            <a:r>
+              <a:rPr lang="en-US" strike="sngStrike" dirty="0"/>
+              <a:t>Show heat</a:t>
+            </a:r>
+          </a:p>
+          <a:p>
+            <a:r>
+              <a:rPr lang="en-US" strike="sngStrike" dirty="0"/>
+              <a:t>When rocket dropping back, fuel stops, but when it hits the bottom of the screen, it should explode….. </a:t>
+            </a:r>
+          </a:p>
+        </p:txBody>
+      </p:sp>
+    </p:spTree>
+    <p:extLst>
+      <p:ext uri="{BB962C8B-B14F-4D97-AF65-F5344CB8AC3E}">
+        <p14:creationId xmlns:p14="http://schemas.microsoft.com/office/powerpoint/2010/main" val="871130498"/>
+      </p:ext>
+    </p:extLst>
+  </p:cSld>
+  <p:clrMapOvr>
+    <a:masterClrMapping/>
+  </p:clrMapOvr>
+</p:sld>
+</file>
+
+<file path=ppt/slides/slide4.xml><?xml version="1.0" encoding="utf-8"?>
+<p:sld xmlns:a="http://schemas.openxmlformats.org/drawingml/2006/main" xmlns:r="http://schemas.openxmlformats.org/officeDocument/2006/relationships" xmlns:p="http://schemas.openxmlformats.org/presentationml/2006/main">
+  <p:cSld>
+    <p:spTree>
+      <p:nvGrpSpPr>
+        <p:cNvPr id="1" name=""/>
+        <p:cNvGrpSpPr/>
+        <p:nvPr/>
+      </p:nvGrpSpPr>
+      <p:grpSpPr>
+        <a:xfrm>
+          <a:off x="0" y="0"/>
+          <a:ext cx="0" cy="0"/>
+          <a:chOff x="0" y="0"/>
+          <a:chExt cx="0" cy="0"/>
+        </a:xfrm>
+      </p:grpSpPr>
+      <p:sp>
+        <p:nvSpPr>
+          <p:cNvPr id="2" name="Title 1">
+            <a:extLst>
+              <a:ext uri="{FF2B5EF4-FFF2-40B4-BE49-F238E27FC236}">
+                <a16:creationId xmlns:a16="http://schemas.microsoft.com/office/drawing/2014/main" id="{EA4D8C31-3C17-2944-B111-ED6F2DF832C1}"/>
+              </a:ext>
+            </a:extLst>
+          </p:cNvPr>
+          <p:cNvSpPr>
+            <a:spLocks noGrp="1"/>
+          </p:cNvSpPr>
+          <p:nvPr>
+            <p:ph type="title"/>
+          </p:nvPr>
+        </p:nvSpPr>
+        <p:spPr/>
+        <p:txBody>
+          <a:bodyPr/>
+          <a:lstStyle/>
+          <a:p>
+            <a:r>
+              <a:rPr lang="en-US" dirty="0"/>
               <a:t>Bugs</a:t>
             </a:r>
           </a:p>
@@ -4126,169 +4245,19 @@
         </p:spPr>
         <p:txBody>
           <a:bodyPr>
-            <a:normAutofit fontScale="62500" lnSpcReduction="20000"/>
+            <a:normAutofit/>
           </a:bodyPr>
           <a:lstStyle/>
           <a:p>
             <a:r>
               <a:rPr lang="en-US" strike="sngStrike" dirty="0"/>
-              <a:t>When power is not applied. heat should drop back – think this works.</a:t>
-            </a:r>
-          </a:p>
-          <a:p>
-            <a:endParaRPr lang="en-US" dirty="0"/>
-          </a:p>
-          <a:p>
-            <a:r>
-              <a:rPr lang="en-US" b="1" strike="sngStrike" dirty="0"/>
-              <a:t>Heat</a:t>
-            </a:r>
-          </a:p>
-          <a:p>
-            <a:r>
-              <a:rPr lang="en-US" b="1" dirty="0"/>
-              <a:t> </a:t>
-            </a:r>
-            <a:r>
-              <a:rPr lang="en-US" b="1" strike="sngStrike" dirty="0" err="1"/>
-              <a:t>heatframe</a:t>
-            </a:r>
-            <a:r>
-              <a:rPr lang="en-US" b="1" strike="sngStrike" dirty="0"/>
-              <a:t> = 0</a:t>
+              <a:t>Launchpad needs to disappear correctly when rocket takes off</a:t>
             </a:r>
           </a:p>
           <a:p>
             <a:r>
               <a:rPr lang="en-US" strike="sngStrike" dirty="0"/>
-              <a:t> heat – each frame increase </a:t>
-            </a:r>
-            <a:r>
-              <a:rPr lang="en-US" strike="sngStrike" dirty="0" err="1"/>
-              <a:t>heatframe</a:t>
-            </a:r>
-            <a:r>
-              <a:rPr lang="en-US" strike="sngStrike" dirty="0"/>
-              <a:t> by1 </a:t>
-            </a:r>
-            <a:r>
-              <a:rPr lang="en-US" dirty="0"/>
-              <a:t>– </a:t>
-            </a:r>
-            <a:r>
-              <a:rPr lang="en-US" strike="sngStrike" dirty="0"/>
-              <a:t>check if button is pressed</a:t>
-            </a:r>
-          </a:p>
-          <a:p>
-            <a:r>
-              <a:rPr lang="en-US" strike="sngStrike" dirty="0"/>
-              <a:t>    if button is pressed, add 1 to </a:t>
-            </a:r>
-            <a:r>
-              <a:rPr lang="en-US" strike="sngStrike" dirty="0" err="1"/>
-              <a:t>heatcounter</a:t>
-            </a:r>
-            <a:endParaRPr lang="en-US" strike="sngStrike" dirty="0"/>
-          </a:p>
-          <a:p>
-            <a:r>
-              <a:rPr lang="en-US" strike="sngStrike" dirty="0"/>
-              <a:t>    if button is not pressed, subtract 1 from </a:t>
-            </a:r>
-            <a:r>
-              <a:rPr lang="en-US" strike="sngStrike" dirty="0" err="1"/>
-              <a:t>heatcounter</a:t>
-            </a:r>
-            <a:endParaRPr lang="en-US" strike="sngStrike" dirty="0"/>
-          </a:p>
-          <a:p>
-            <a:r>
-              <a:rPr lang="en-US" strike="sngStrike" dirty="0"/>
-              <a:t> each 60 frames (n is 60 per second – if check required, set </a:t>
-            </a:r>
-            <a:r>
-              <a:rPr lang="en-US" strike="sngStrike" dirty="0" err="1"/>
-              <a:t>heatframe</a:t>
-            </a:r>
-            <a:r>
-              <a:rPr lang="en-US" strike="sngStrike" dirty="0"/>
-              <a:t> to zero), check to see if </a:t>
-            </a:r>
-            <a:r>
-              <a:rPr lang="en-US" strike="sngStrike" dirty="0" err="1"/>
-              <a:t>heatcounter</a:t>
-            </a:r>
-            <a:r>
-              <a:rPr lang="en-US" strike="sngStrike" dirty="0"/>
-              <a:t> &gt;= 60</a:t>
-            </a:r>
-          </a:p>
-          <a:p>
-            <a:r>
-              <a:rPr lang="en-US" strike="sngStrike" dirty="0"/>
-              <a:t> if </a:t>
-            </a:r>
-            <a:r>
-              <a:rPr lang="en-US" strike="sngStrike" dirty="0" err="1"/>
-              <a:t>heatcounter</a:t>
-            </a:r>
-            <a:r>
-              <a:rPr lang="en-US" strike="sngStrike" dirty="0"/>
-              <a:t> &gt;= 60 then increase level by </a:t>
-            </a:r>
-            <a:r>
-              <a:rPr lang="en-US" strike="sngStrike" dirty="0" err="1"/>
-              <a:t>heatuse</a:t>
-            </a:r>
-            <a:r>
-              <a:rPr lang="en-US" strike="sngStrike" dirty="0"/>
-              <a:t> and set n and </a:t>
-            </a:r>
-            <a:r>
-              <a:rPr lang="en-US" strike="sngStrike" dirty="0" err="1"/>
-              <a:t>heatcounter</a:t>
-            </a:r>
-            <a:r>
-              <a:rPr lang="en-US" strike="sngStrike" dirty="0"/>
-              <a:t> to zero.</a:t>
-            </a:r>
-          </a:p>
-          <a:p>
-            <a:r>
-              <a:rPr lang="en-US" strike="sngStrike" dirty="0"/>
-              <a:t>      else decrease level by </a:t>
-            </a:r>
-            <a:r>
-              <a:rPr lang="en-US" strike="sngStrike" dirty="0" err="1"/>
-              <a:t>heatuse</a:t>
-            </a:r>
-            <a:r>
-              <a:rPr lang="en-US" strike="sngStrike" dirty="0"/>
-              <a:t> and set n and </a:t>
-            </a:r>
-            <a:r>
-              <a:rPr lang="en-US" strike="sngStrike" dirty="0" err="1"/>
-              <a:t>heatcounter</a:t>
-            </a:r>
-            <a:r>
-              <a:rPr lang="en-US" strike="sngStrike" dirty="0"/>
-              <a:t> to zero.</a:t>
-            </a:r>
-          </a:p>
-          <a:p>
-            <a:r>
-              <a:rPr lang="en-US" dirty="0"/>
-              <a:t> </a:t>
-            </a:r>
-          </a:p>
-          <a:p>
-            <a:endParaRPr lang="en-US" dirty="0"/>
-          </a:p>
-          <a:p>
-            <a:r>
-              <a:rPr lang="en-US" dirty="0"/>
-              <a:t>NOTE THAT 60 will be variable once this works…..</a:t>
+              <a:t>When power is not applied. heat should drop back</a:t>
             </a:r>
           </a:p>
         </p:txBody>
@@ -4306,7 +4275,7 @@
 </p:sld>
 </file>
 
-<file path=ppt/slides/slide4.xml><?xml version="1.0" encoding="utf-8"?>
+<file path=ppt/slides/slide5.xml><?xml version="1.0" encoding="utf-8"?>
 <p:sld xmlns:a="http://schemas.openxmlformats.org/drawingml/2006/main" xmlns:r="http://schemas.openxmlformats.org/officeDocument/2006/relationships" xmlns:p="http://schemas.openxmlformats.org/presentationml/2006/main">
   <p:cSld>
     <p:spTree>
@@ -4444,8 +4413,8 @@
         </p:blipFill>
         <p:spPr>
           <a:xfrm>
-            <a:off x="4405356" y="1489504"/>
-            <a:ext cx="6692900" cy="419100"/>
+            <a:off x="8270073" y="1782406"/>
+            <a:ext cx="3760563" cy="235482"/>
           </a:xfrm>
           <a:prstGeom prst="rect">
             <a:avLst/>
@@ -4474,7 +4443,7 @@
         </p:blipFill>
         <p:spPr>
           <a:xfrm>
-            <a:off x="5178207" y="864493"/>
+            <a:off x="6013562" y="820121"/>
             <a:ext cx="5499100" cy="406400"/>
           </a:xfrm>
           <a:prstGeom prst="rect">
@@ -4504,7 +4473,7 @@
         </p:blipFill>
         <p:spPr>
           <a:xfrm>
-            <a:off x="9540755" y="3553613"/>
+            <a:off x="9794981" y="4816356"/>
             <a:ext cx="1819507" cy="134467"/>
           </a:xfrm>
           <a:prstGeom prst="rect">
@@ -4648,7 +4617,7 @@
         </p:nvGrpSpPr>
         <p:grpSpPr>
           <a:xfrm>
-            <a:off x="4782065" y="2128794"/>
+            <a:off x="5510799" y="2316480"/>
             <a:ext cx="3962400" cy="3962400"/>
             <a:chOff x="4782065" y="2128794"/>
             <a:chExt cx="3962400" cy="3962400"/>
@@ -4917,6 +4886,66 @@
           </p:spPr>
         </p:pic>
       </p:grpSp>
+      <p:pic>
+        <p:nvPicPr>
+          <p:cNvPr id="27" name="Picture 26">
+            <a:extLst>
+              <a:ext uri="{FF2B5EF4-FFF2-40B4-BE49-F238E27FC236}">
+                <a16:creationId xmlns:a16="http://schemas.microsoft.com/office/drawing/2014/main" id="{F1D5FE27-D393-7147-AAF8-2A32FCDC10B8}"/>
+              </a:ext>
+            </a:extLst>
+          </p:cNvPr>
+          <p:cNvPicPr>
+            <a:picLocks noChangeAspect="1"/>
+          </p:cNvPicPr>
+          <p:nvPr/>
+        </p:nvPicPr>
+        <p:blipFill>
+          <a:blip r:embed="rId6"/>
+          <a:stretch>
+            <a:fillRect/>
+          </a:stretch>
+        </p:blipFill>
+        <p:spPr>
+          <a:xfrm>
+            <a:off x="4114800" y="1447800"/>
+            <a:ext cx="3962400" cy="3962400"/>
+          </a:xfrm>
+          <a:prstGeom prst="rect">
+            <a:avLst/>
+          </a:prstGeom>
+        </p:spPr>
+      </p:pic>
+      <p:pic>
+        <p:nvPicPr>
+          <p:cNvPr id="28" name="Picture 27">
+            <a:extLst>
+              <a:ext uri="{FF2B5EF4-FFF2-40B4-BE49-F238E27FC236}">
+                <a16:creationId xmlns:a16="http://schemas.microsoft.com/office/drawing/2014/main" id="{926D0571-5344-824C-AAA0-137712E6B657}"/>
+              </a:ext>
+            </a:extLst>
+          </p:cNvPr>
+          <p:cNvPicPr>
+            <a:picLocks noChangeAspect="1"/>
+          </p:cNvPicPr>
+          <p:nvPr/>
+        </p:nvPicPr>
+        <p:blipFill>
+          <a:blip r:embed="rId7"/>
+          <a:stretch>
+            <a:fillRect/>
+          </a:stretch>
+        </p:blipFill>
+        <p:spPr>
+          <a:xfrm>
+            <a:off x="9851527" y="2579680"/>
+            <a:ext cx="1828800" cy="139700"/>
+          </a:xfrm>
+          <a:prstGeom prst="rect">
+            <a:avLst/>
+          </a:prstGeom>
+        </p:spPr>
+      </p:pic>
     </p:spTree>
     <p:extLst>
       <p:ext uri="{BB962C8B-B14F-4D97-AF65-F5344CB8AC3E}">
@@ -4930,7 +4959,7 @@
 </p:sld>
 </file>
 
-<file path=ppt/slides/slide5.xml><?xml version="1.0" encoding="utf-8"?>
+<file path=ppt/slides/slide6.xml><?xml version="1.0" encoding="utf-8"?>
 <p:sld xmlns:a="http://schemas.openxmlformats.org/drawingml/2006/main" xmlns:r="http://schemas.openxmlformats.org/officeDocument/2006/relationships" xmlns:p="http://schemas.openxmlformats.org/presentationml/2006/main">
   <p:cSld>
     <p:bg>

</xml_diff>

<commit_message>
Finished start screen with skyrokit logo and copyright image Redid launch pad Made starfield start blank, then steadily increase the amount of stars Made rocket able to go higher on the screen
</commit_message>
<xml_diff>
--- a/notes.pptx
+++ b/notes.pptx
@@ -3933,7 +3933,7 @@
         <p:spPr/>
         <p:txBody>
           <a:bodyPr>
-            <a:normAutofit fontScale="55000" lnSpcReduction="20000"/>
+            <a:normAutofit fontScale="32500" lnSpcReduction="20000"/>
           </a:bodyPr>
           <a:lstStyle/>
           <a:p>
@@ -3972,21 +3972,27 @@
           </a:p>
           <a:p>
             <a:r>
-              <a:rPr lang="en-US" dirty="0"/>
+              <a:rPr lang="en-US" strike="sngStrike" dirty="0"/>
               <a:t>Finish start screen with </a:t>
             </a:r>
             <a:r>
-              <a:rPr lang="en-US" dirty="0" err="1"/>
+              <a:rPr lang="en-US" strike="sngStrike" dirty="0" err="1"/>
               <a:t>skyrokit</a:t>
             </a:r>
             <a:r>
-              <a:rPr lang="en-US" dirty="0"/>
+              <a:rPr lang="en-US" strike="sngStrike" dirty="0"/>
               <a:t> logo and copyright image</a:t>
             </a:r>
           </a:p>
           <a:p>
             <a:r>
-              <a:rPr lang="en-US" dirty="0"/>
+              <a:rPr lang="en-US" strike="sngStrike" dirty="0"/>
+              <a:t>Redid launch pad</a:t>
+            </a:r>
+          </a:p>
+          <a:p>
+            <a:r>
+              <a:rPr lang="en-US" strike="sngStrike" dirty="0"/>
               <a:t>Make starfield start blank, then steadily increase the amount of stars</a:t>
             </a:r>
           </a:p>
@@ -4001,6 +4007,38 @@
               <a:rPr lang="en-US" dirty="0"/>
               <a:t>-------</a:t>
             </a:r>
+          </a:p>
+          <a:p>
+            <a:r>
+              <a:rPr lang="en-US" dirty="0"/>
+              <a:t>Mission</a:t>
+            </a:r>
+          </a:p>
+          <a:p>
+            <a:pPr lvl="1"/>
+            <a:r>
+              <a:rPr lang="en-US" dirty="0"/>
+              <a:t>Remove wings on takeoff</a:t>
+            </a:r>
+          </a:p>
+          <a:p>
+            <a:pPr lvl="1"/>
+            <a:r>
+              <a:rPr lang="en-US" dirty="0"/>
+              <a:t>Deploy payload</a:t>
+            </a:r>
+          </a:p>
+          <a:p>
+            <a:pPr lvl="1"/>
+            <a:r>
+              <a:rPr lang="en-US" dirty="0"/>
+              <a:t>Allow retros too fire and </a:t>
+            </a:r>
+            <a:r>
+              <a:rPr lang="en-US"/>
+              <a:t>release landing legs</a:t>
+            </a:r>
+            <a:endParaRPr lang="en-US" dirty="0"/>
           </a:p>
           <a:p>
             <a:r>

</xml_diff>

<commit_message>
Remooval of fins and sound when they detatch and fall away
</commit_message>
<xml_diff>
--- a/notes.pptx
+++ b/notes.pptx
@@ -3933,7 +3933,7 @@
         <p:spPr/>
         <p:txBody>
           <a:bodyPr>
-            <a:normAutofit fontScale="32500" lnSpcReduction="20000"/>
+            <a:normAutofit fontScale="55000" lnSpcReduction="20000"/>
           </a:bodyPr>
           <a:lstStyle/>
           <a:p>
@@ -3972,38 +3972,6 @@
           </a:p>
           <a:p>
             <a:r>
-              <a:rPr lang="en-US" strike="sngStrike" dirty="0"/>
-              <a:t>Finish start screen with </a:t>
-            </a:r>
-            <a:r>
-              <a:rPr lang="en-US" strike="sngStrike" dirty="0" err="1"/>
-              <a:t>skyrokit</a:t>
-            </a:r>
-            <a:r>
-              <a:rPr lang="en-US" strike="sngStrike" dirty="0"/>
-              <a:t> logo and copyright image</a:t>
-            </a:r>
-          </a:p>
-          <a:p>
-            <a:r>
-              <a:rPr lang="en-US" strike="sngStrike" dirty="0"/>
-              <a:t>Redid launch pad</a:t>
-            </a:r>
-          </a:p>
-          <a:p>
-            <a:r>
-              <a:rPr lang="en-US" strike="sngStrike" dirty="0"/>
-              <a:t>Make starfield start blank, then steadily increase the amount of stars</a:t>
-            </a:r>
-          </a:p>
-          <a:p>
-            <a:r>
-              <a:rPr lang="en-US" strike="sngStrike" dirty="0"/>
-              <a:t>Make rocket able to go higher on the screen</a:t>
-            </a:r>
-          </a:p>
-          <a:p>
-            <a:r>
               <a:rPr lang="en-US" dirty="0"/>
               <a:t>-------</a:t>
             </a:r>
@@ -4017,7 +3985,7 @@
           <a:p>
             <a:pPr lvl="1"/>
             <a:r>
-              <a:rPr lang="en-US" dirty="0"/>
+              <a:rPr lang="en-US" strike="sngStrike" dirty="0"/>
               <a:t>Remove wings on takeoff</a:t>
             </a:r>
           </a:p>
@@ -4032,13 +4000,8 @@
             <a:pPr lvl="1"/>
             <a:r>
               <a:rPr lang="en-US" dirty="0"/>
-              <a:t>Allow retros too fire and </a:t>
-            </a:r>
-            <a:r>
-              <a:rPr lang="en-US"/>
-              <a:t>release landing legs</a:t>
-            </a:r>
-            <a:endParaRPr lang="en-US" dirty="0"/>
+              <a:t>Allow retros too fire and release landing legs</a:t>
+            </a:r>
           </a:p>
           <a:p>
             <a:r>
@@ -4161,7 +4124,7 @@
         <p:spPr/>
         <p:txBody>
           <a:bodyPr>
-            <a:normAutofit/>
+            <a:normAutofit fontScale="92500" lnSpcReduction="20000"/>
           </a:bodyPr>
           <a:lstStyle/>
           <a:p>
@@ -4198,6 +4161,41 @@
               <a:rPr lang="en-US" strike="sngStrike" dirty="0"/>
               <a:t>When rocket dropping back, fuel stops, but when it hits the bottom of the screen, it should explode….. </a:t>
             </a:r>
+          </a:p>
+          <a:p>
+            <a:r>
+              <a:rPr lang="en-US" strike="sngStrike" dirty="0"/>
+              <a:t>Finish start screen with </a:t>
+            </a:r>
+            <a:r>
+              <a:rPr lang="en-US" strike="sngStrike" dirty="0" err="1"/>
+              <a:t>skyrokit</a:t>
+            </a:r>
+            <a:r>
+              <a:rPr lang="en-US" strike="sngStrike" dirty="0"/>
+              <a:t> logo and copyright image</a:t>
+            </a:r>
+          </a:p>
+          <a:p>
+            <a:r>
+              <a:rPr lang="en-US" strike="sngStrike" dirty="0"/>
+              <a:t>Redid launch pad</a:t>
+            </a:r>
+          </a:p>
+          <a:p>
+            <a:r>
+              <a:rPr lang="en-US" strike="sngStrike" dirty="0"/>
+              <a:t>Make starfield start blank, then steadily increase the amount of stars</a:t>
+            </a:r>
+          </a:p>
+          <a:p>
+            <a:r>
+              <a:rPr lang="en-US" strike="sngStrike" dirty="0"/>
+              <a:t>Make rocket able to go higher on the screen</a:t>
+            </a:r>
+          </a:p>
+          <a:p>
+            <a:endParaRPr lang="en-US" strike="sngStrike" dirty="0"/>
           </a:p>
         </p:txBody>
       </p:sp>

</xml_diff>

<commit_message>
Added facility for coloured stars, and first go at music,
</commit_message>
<xml_diff>
--- a/notes.pptx
+++ b/notes.pptx
@@ -3933,7 +3933,7 @@
         <p:spPr/>
         <p:txBody>
           <a:bodyPr>
-            <a:normAutofit fontScale="55000" lnSpcReduction="20000"/>
+            <a:normAutofit fontScale="47500" lnSpcReduction="20000"/>
           </a:bodyPr>
           <a:lstStyle/>
           <a:p>
@@ -3972,6 +3972,26 @@
           </a:p>
           <a:p>
             <a:r>
+              <a:rPr lang="en-US" strike="sngStrike" dirty="0"/>
+              <a:t>Added facility for </a:t>
+            </a:r>
+            <a:r>
+              <a:rPr lang="en-US" strike="sngStrike" dirty="0" err="1"/>
+              <a:t>coloured</a:t>
+            </a:r>
+            <a:r>
+              <a:rPr lang="en-US" strike="sngStrike" dirty="0"/>
+              <a:t> stars (on/off)</a:t>
+            </a:r>
+          </a:p>
+          <a:p>
+            <a:r>
+              <a:rPr lang="en-US" strike="sngStrike" dirty="0"/>
+              <a:t>Music</a:t>
+            </a:r>
+          </a:p>
+          <a:p>
+            <a:r>
               <a:rPr lang="en-US" dirty="0"/>
               <a:t>-------</a:t>
             </a:r>
@@ -4000,7 +4020,7 @@
             <a:pPr lvl="1"/>
             <a:r>
               <a:rPr lang="en-US" dirty="0"/>
-              <a:t>Allow retros too fire and release landing legs</a:t>
+              <a:t>Allow retros to fire and release landing legs</a:t>
             </a:r>
           </a:p>
           <a:p>
@@ -4030,7 +4050,7 @@
           <a:p>
             <a:r>
               <a:rPr lang="en-US" dirty="0"/>
-              <a:t>Music</a:t>
+              <a:t>Add random comets flying across the screen as you get higher</a:t>
             </a:r>
           </a:p>
           <a:p>

</xml_diff>

<commit_message>
Last fixes for V0.1
</commit_message>
<xml_diff>
--- a/notes.pptx
+++ b/notes.pptx
@@ -266,7 +266,7 @@
           <a:p>
             <a:fld id="{2520F6F4-E946-1746-9921-C7E20A3E8025}" type="datetimeFigureOut">
               <a:rPr lang="en-US" smtClean="0"/>
-              <a:t>3/25/20</a:t>
+              <a:t>4/10/20</a:t>
             </a:fld>
             <a:endParaRPr lang="en-US"/>
           </a:p>
@@ -466,7 +466,7 @@
           <a:p>
             <a:fld id="{2520F6F4-E946-1746-9921-C7E20A3E8025}" type="datetimeFigureOut">
               <a:rPr lang="en-US" smtClean="0"/>
-              <a:t>3/25/20</a:t>
+              <a:t>4/10/20</a:t>
             </a:fld>
             <a:endParaRPr lang="en-US"/>
           </a:p>
@@ -676,7 +676,7 @@
           <a:p>
             <a:fld id="{2520F6F4-E946-1746-9921-C7E20A3E8025}" type="datetimeFigureOut">
               <a:rPr lang="en-US" smtClean="0"/>
-              <a:t>3/25/20</a:t>
+              <a:t>4/10/20</a:t>
             </a:fld>
             <a:endParaRPr lang="en-US"/>
           </a:p>
@@ -876,7 +876,7 @@
           <a:p>
             <a:fld id="{2520F6F4-E946-1746-9921-C7E20A3E8025}" type="datetimeFigureOut">
               <a:rPr lang="en-US" smtClean="0"/>
-              <a:t>3/25/20</a:t>
+              <a:t>4/10/20</a:t>
             </a:fld>
             <a:endParaRPr lang="en-US"/>
           </a:p>
@@ -1152,7 +1152,7 @@
           <a:p>
             <a:fld id="{2520F6F4-E946-1746-9921-C7E20A3E8025}" type="datetimeFigureOut">
               <a:rPr lang="en-US" smtClean="0"/>
-              <a:t>3/25/20</a:t>
+              <a:t>4/10/20</a:t>
             </a:fld>
             <a:endParaRPr lang="en-US"/>
           </a:p>
@@ -1420,7 +1420,7 @@
           <a:p>
             <a:fld id="{2520F6F4-E946-1746-9921-C7E20A3E8025}" type="datetimeFigureOut">
               <a:rPr lang="en-US" smtClean="0"/>
-              <a:t>3/25/20</a:t>
+              <a:t>4/10/20</a:t>
             </a:fld>
             <a:endParaRPr lang="en-US"/>
           </a:p>
@@ -1835,7 +1835,7 @@
           <a:p>
             <a:fld id="{2520F6F4-E946-1746-9921-C7E20A3E8025}" type="datetimeFigureOut">
               <a:rPr lang="en-US" smtClean="0"/>
-              <a:t>3/25/20</a:t>
+              <a:t>4/10/20</a:t>
             </a:fld>
             <a:endParaRPr lang="en-US"/>
           </a:p>
@@ -1977,7 +1977,7 @@
           <a:p>
             <a:fld id="{2520F6F4-E946-1746-9921-C7E20A3E8025}" type="datetimeFigureOut">
               <a:rPr lang="en-US" smtClean="0"/>
-              <a:t>3/25/20</a:t>
+              <a:t>4/10/20</a:t>
             </a:fld>
             <a:endParaRPr lang="en-US"/>
           </a:p>
@@ -2090,7 +2090,7 @@
           <a:p>
             <a:fld id="{2520F6F4-E946-1746-9921-C7E20A3E8025}" type="datetimeFigureOut">
               <a:rPr lang="en-US" smtClean="0"/>
-              <a:t>3/25/20</a:t>
+              <a:t>4/10/20</a:t>
             </a:fld>
             <a:endParaRPr lang="en-US"/>
           </a:p>
@@ -2403,7 +2403,7 @@
           <a:p>
             <a:fld id="{2520F6F4-E946-1746-9921-C7E20A3E8025}" type="datetimeFigureOut">
               <a:rPr lang="en-US" smtClean="0"/>
-              <a:t>3/25/20</a:t>
+              <a:t>4/10/20</a:t>
             </a:fld>
             <a:endParaRPr lang="en-US"/>
           </a:p>
@@ -2692,7 +2692,7 @@
           <a:p>
             <a:fld id="{2520F6F4-E946-1746-9921-C7E20A3E8025}" type="datetimeFigureOut">
               <a:rPr lang="en-US" smtClean="0"/>
-              <a:t>3/25/20</a:t>
+              <a:t>4/10/20</a:t>
             </a:fld>
             <a:endParaRPr lang="en-US"/>
           </a:p>
@@ -2935,7 +2935,7 @@
           <a:p>
             <a:fld id="{2520F6F4-E946-1746-9921-C7E20A3E8025}" type="datetimeFigureOut">
               <a:rPr lang="en-US" smtClean="0"/>
-              <a:t>3/25/20</a:t>
+              <a:t>4/10/20</a:t>
             </a:fld>
             <a:endParaRPr lang="en-US"/>
           </a:p>
@@ -4067,6 +4067,46 @@
           </a:p>
         </p:txBody>
       </p:sp>
+      <p:sp>
+        <p:nvSpPr>
+          <p:cNvPr id="7" name="Rectangle 6">
+            <a:extLst>
+              <a:ext uri="{FF2B5EF4-FFF2-40B4-BE49-F238E27FC236}">
+                <a16:creationId xmlns:a16="http://schemas.microsoft.com/office/drawing/2014/main" id="{D8416C46-87E2-ED49-A254-9F1B3DB3B759}"/>
+              </a:ext>
+            </a:extLst>
+          </p:cNvPr>
+          <p:cNvSpPr/>
+          <p:nvPr/>
+        </p:nvSpPr>
+        <p:spPr>
+          <a:xfrm>
+            <a:off x="5732585" y="3867835"/>
+            <a:ext cx="6096000" cy="646331"/>
+          </a:xfrm>
+          <a:prstGeom prst="rect">
+            <a:avLst/>
+          </a:prstGeom>
+        </p:spPr>
+        <p:txBody>
+          <a:bodyPr>
+            <a:spAutoFit/>
+          </a:bodyPr>
+          <a:lstStyle/>
+          <a:p>
+            <a:r>
+              <a:rPr lang="en-US" dirty="0">
+                <a:hlinkClick r:id="rId2"/>
+              </a:rPr>
+              <a:t>http://educationmusicale.ac-besancon.fr/wp-content/uploads/sites/42/2015/10/Piano_Copland.pdf</a:t>
+            </a:r>
+            <a:r>
+              <a:rPr lang="en-US" dirty="0"/>
+              <a:t> </a:t>
+            </a:r>
+          </a:p>
+        </p:txBody>
+      </p:sp>
     </p:spTree>
     <p:extLst>
       <p:ext uri="{BB962C8B-B14F-4D97-AF65-F5344CB8AC3E}">

</xml_diff>